<commit_message>
The package submitted to the web learning as the first simulation homework
</commit_message>
<xml_diff>
--- a/Project/Pro1/Control_1.pptx
+++ b/Project/Pro1/Control_1.pptx
@@ -5,7 +5,7 @@
     <p:sldMasterId id="2147483648" r:id="rId1"/>
   </p:sldMasterIdLst>
   <p:notesMasterIdLst>
-    <p:notesMasterId r:id="rId8"/>
+    <p:notesMasterId r:id="rId14"/>
   </p:notesMasterIdLst>
   <p:sldIdLst>
     <p:sldId id="256" r:id="rId2"/>
@@ -14,6 +14,12 @@
     <p:sldId id="261" r:id="rId5"/>
     <p:sldId id="260" r:id="rId6"/>
     <p:sldId id="262" r:id="rId7"/>
+    <p:sldId id="263" r:id="rId8"/>
+    <p:sldId id="264" r:id="rId9"/>
+    <p:sldId id="268" r:id="rId10"/>
+    <p:sldId id="267" r:id="rId11"/>
+    <p:sldId id="265" r:id="rId12"/>
+    <p:sldId id="266" r:id="rId13"/>
   </p:sldIdLst>
   <p:sldSz cx="12192000" cy="6858000"/>
   <p:notesSz cx="6858000" cy="9144000"/>
@@ -202,7 +208,7 @@
           <a:p>
             <a:fld id="{B998F941-77E6-5546-A776-6F1590B1BA02}" type="datetimeFigureOut">
               <a:rPr kumimoji="1" lang="zh-CN" altLang="en-US" smtClean="0"/>
-              <a:t>2017/4/18</a:t>
+              <a:t>2017/4/22</a:t>
             </a:fld>
             <a:endParaRPr kumimoji="1" lang="zh-CN" altLang="en-US"/>
           </a:p>
@@ -640,7 +646,7 @@
             <a:fld id="{87DE6118-2437-4B30-8E3C-4D2BE6020583}" type="datetimeFigureOut">
               <a:rPr lang="en-US" dirty="0"/>
               <a:pPr/>
-              <a:t>4/18/17</a:t>
+              <a:t>4/22/2017</a:t>
             </a:fld>
             <a:endParaRPr lang="en-US" dirty="0"/>
           </a:p>
@@ -966,7 +972,7 @@
           <a:p>
             <a:fld id="{87DE6118-2437-4B30-8E3C-4D2BE6020583}" type="datetimeFigureOut">
               <a:rPr lang="en-US" dirty="0"/>
-              <a:t>4/18/17</a:t>
+              <a:t>4/22/2017</a:t>
             </a:fld>
             <a:endParaRPr lang="en-US" dirty="0"/>
           </a:p>
@@ -1141,7 +1147,7 @@
           <a:p>
             <a:fld id="{87DE6118-2437-4B30-8E3C-4D2BE6020583}" type="datetimeFigureOut">
               <a:rPr lang="en-US" dirty="0"/>
-              <a:t>4/18/17</a:t>
+              <a:t>4/22/2017</a:t>
             </a:fld>
             <a:endParaRPr lang="en-US" dirty="0"/>
           </a:p>
@@ -1306,7 +1312,7 @@
           <a:p>
             <a:fld id="{87DE6118-2437-4B30-8E3C-4D2BE6020583}" type="datetimeFigureOut">
               <a:rPr lang="en-US" dirty="0"/>
-              <a:t>4/18/17</a:t>
+              <a:t>4/22/2017</a:t>
             </a:fld>
             <a:endParaRPr lang="en-US" dirty="0"/>
           </a:p>
@@ -1579,7 +1585,7 @@
             <a:fld id="{87DE6118-2437-4B30-8E3C-4D2BE6020583}" type="datetimeFigureOut">
               <a:rPr lang="en-US" dirty="0"/>
               <a:pPr/>
-              <a:t>4/18/17</a:t>
+              <a:t>4/22/2017</a:t>
             </a:fld>
             <a:endParaRPr lang="en-US" dirty="0"/>
           </a:p>
@@ -1969,7 +1975,7 @@
           <a:p>
             <a:fld id="{87DE6118-2437-4B30-8E3C-4D2BE6020583}" type="datetimeFigureOut">
               <a:rPr lang="en-US" dirty="0"/>
-              <a:t>4/18/17</a:t>
+              <a:t>4/22/2017</a:t>
             </a:fld>
             <a:endParaRPr lang="en-US" dirty="0"/>
           </a:p>
@@ -2441,7 +2447,7 @@
           <a:p>
             <a:fld id="{87DE6118-2437-4B30-8E3C-4D2BE6020583}" type="datetimeFigureOut">
               <a:rPr lang="en-US" dirty="0"/>
-              <a:t>4/18/17</a:t>
+              <a:t>4/22/2017</a:t>
             </a:fld>
             <a:endParaRPr lang="en-US" dirty="0"/>
           </a:p>
@@ -2554,7 +2560,7 @@
           <a:p>
             <a:fld id="{87DE6118-2437-4B30-8E3C-4D2BE6020583}" type="datetimeFigureOut">
               <a:rPr lang="en-US" dirty="0"/>
-              <a:t>4/18/17</a:t>
+              <a:t>4/22/2017</a:t>
             </a:fld>
             <a:endParaRPr lang="en-US" dirty="0"/>
           </a:p>
@@ -2644,7 +2650,7 @@
           <a:p>
             <a:fld id="{87DE6118-2437-4B30-8E3C-4D2BE6020583}" type="datetimeFigureOut">
               <a:rPr lang="en-US" dirty="0"/>
-              <a:t>4/18/17</a:t>
+              <a:t>4/22/2017</a:t>
             </a:fld>
             <a:endParaRPr lang="en-US" dirty="0"/>
           </a:p>
@@ -2986,7 +2992,7 @@
             <a:fld id="{87DE6118-2437-4B30-8E3C-4D2BE6020583}" type="datetimeFigureOut">
               <a:rPr lang="en-US" dirty="0"/>
               <a:pPr/>
-              <a:t>4/18/17</a:t>
+              <a:t>4/22/2017</a:t>
             </a:fld>
             <a:endParaRPr lang="en-US" dirty="0"/>
           </a:p>
@@ -3371,7 +3377,7 @@
             <a:fld id="{87DE6118-2437-4B30-8E3C-4D2BE6020583}" type="datetimeFigureOut">
               <a:rPr lang="en-US" dirty="0"/>
               <a:pPr/>
-              <a:t>4/18/17</a:t>
+              <a:t>4/22/2017</a:t>
             </a:fld>
             <a:endParaRPr lang="en-US" dirty="0"/>
           </a:p>
@@ -3646,7 +3652,7 @@
             <a:fld id="{87DE6118-2437-4B30-8E3C-4D2BE6020583}" type="datetimeFigureOut">
               <a:rPr lang="en-US" dirty="0"/>
               <a:pPr/>
-              <a:t>4/18/17</a:t>
+              <a:t>4/22/2017</a:t>
             </a:fld>
             <a:endParaRPr lang="en-US" dirty="0"/>
           </a:p>
@@ -4257,6 +4263,951 @@
 </p:sld>
 </file>
 
+<file path=ppt/slides/slide10.xml><?xml version="1.0" encoding="utf-8"?>
+<p:sld xmlns:a="http://schemas.openxmlformats.org/drawingml/2006/main" xmlns:r="http://schemas.openxmlformats.org/officeDocument/2006/relationships" xmlns:p="http://schemas.openxmlformats.org/presentationml/2006/main">
+  <p:cSld>
+    <p:spTree>
+      <p:nvGrpSpPr>
+        <p:cNvPr id="1" name=""/>
+        <p:cNvGrpSpPr/>
+        <p:nvPr/>
+      </p:nvGrpSpPr>
+      <p:grpSpPr>
+        <a:xfrm>
+          <a:off x="0" y="0"/>
+          <a:ext cx="0" cy="0"/>
+          <a:chOff x="0" y="0"/>
+          <a:chExt cx="0" cy="0"/>
+        </a:xfrm>
+      </p:grpSpPr>
+      <p:sp>
+        <p:nvSpPr>
+          <p:cNvPr id="2" name="标题 1"/>
+          <p:cNvSpPr>
+            <a:spLocks noGrp="1"/>
+          </p:cNvSpPr>
+          <p:nvPr>
+            <p:ph type="title"/>
+          </p:nvPr>
+        </p:nvSpPr>
+        <p:spPr>
+          <a:xfrm>
+            <a:off x="1371600" y="178370"/>
+            <a:ext cx="9601200" cy="753533"/>
+          </a:xfrm>
+        </p:spPr>
+        <p:txBody>
+          <a:bodyPr/>
+          <a:lstStyle/>
+          <a:p>
+            <a:r>
+              <a:rPr kumimoji="1" lang="zh-CN" altLang="en-US" b="1" dirty="0" smtClean="0"/>
+              <a:t>状态反馈控制</a:t>
+            </a:r>
+            <a:r>
+              <a:rPr kumimoji="1" lang="en-US" altLang="zh-CN" b="1" dirty="0" smtClean="0"/>
+              <a:t>-</a:t>
+            </a:r>
+            <a:r>
+              <a:rPr kumimoji="1" lang="zh-CN" altLang="en-US" b="1" dirty="0" smtClean="0"/>
+              <a:t>仿真</a:t>
+            </a:r>
+            <a:endParaRPr kumimoji="1" lang="zh-CN" altLang="en-US" b="1" dirty="0"/>
+          </a:p>
+        </p:txBody>
+      </p:sp>
+      <p:sp>
+        <p:nvSpPr>
+          <p:cNvPr id="3" name="内容占位符 2"/>
+          <p:cNvSpPr>
+            <a:spLocks noGrp="1"/>
+          </p:cNvSpPr>
+          <p:nvPr>
+            <p:ph idx="1"/>
+          </p:nvPr>
+        </p:nvSpPr>
+        <p:spPr>
+          <a:xfrm>
+            <a:off x="1371600" y="965199"/>
+            <a:ext cx="9601200" cy="609601"/>
+          </a:xfrm>
+        </p:spPr>
+        <p:txBody>
+          <a:bodyPr>
+            <a:normAutofit/>
+          </a:bodyPr>
+          <a:lstStyle/>
+          <a:p>
+            <a:r>
+              <a:rPr kumimoji="1" lang="en-US" altLang="zh-CN" b="1" dirty="0" smtClean="0"/>
+              <a:t>Simulink</a:t>
+            </a:r>
+            <a:r>
+              <a:rPr kumimoji="1" lang="zh-CN" altLang="en-US" b="1" dirty="0" smtClean="0"/>
+              <a:t>模型车体</a:t>
+            </a:r>
+            <a:r>
+              <a:rPr kumimoji="1" lang="zh-CN" altLang="en-US" b="1" dirty="0" smtClean="0"/>
+              <a:t>扰动</a:t>
+            </a:r>
+            <a:r>
+              <a:rPr kumimoji="1" lang="en-US" altLang="zh-CN" b="1" dirty="0" smtClean="0"/>
+              <a:t>——</a:t>
+            </a:r>
+            <a:r>
+              <a:rPr kumimoji="1" lang="zh-CN" altLang="en-US" b="1" dirty="0" smtClean="0"/>
+              <a:t>车身回正，车体前移</a:t>
+            </a:r>
+            <a:endParaRPr kumimoji="1" lang="en-US" altLang="zh-CN" b="1" dirty="0" smtClean="0"/>
+          </a:p>
+          <a:p>
+            <a:pPr marL="0" indent="0">
+              <a:buNone/>
+            </a:pPr>
+            <a:endParaRPr kumimoji="1" lang="en-US" altLang="zh-CN" b="1" dirty="0" smtClean="0"/>
+          </a:p>
+        </p:txBody>
+      </p:sp>
+      <p:pic>
+        <p:nvPicPr>
+          <p:cNvPr id="5" name="图片 4"/>
+          <p:cNvPicPr>
+            <a:picLocks noChangeAspect="1"/>
+          </p:cNvPicPr>
+          <p:nvPr/>
+        </p:nvPicPr>
+        <p:blipFill>
+          <a:blip r:embed="rId2">
+            <a:extLst>
+              <a:ext uri="{28A0092B-C50C-407E-A947-70E740481C1C}">
+                <a14:useLocalDpi xmlns:a14="http://schemas.microsoft.com/office/drawing/2010/main" val="0"/>
+              </a:ext>
+            </a:extLst>
+          </a:blip>
+          <a:stretch>
+            <a:fillRect/>
+          </a:stretch>
+        </p:blipFill>
+        <p:spPr>
+          <a:xfrm>
+            <a:off x="1371600" y="2306596"/>
+            <a:ext cx="3781700" cy="2836275"/>
+          </a:xfrm>
+          <a:prstGeom prst="rect">
+            <a:avLst/>
+          </a:prstGeom>
+        </p:spPr>
+      </p:pic>
+      <p:pic>
+        <p:nvPicPr>
+          <p:cNvPr id="4" name="图片 3"/>
+          <p:cNvPicPr>
+            <a:picLocks noChangeAspect="1"/>
+          </p:cNvPicPr>
+          <p:nvPr/>
+        </p:nvPicPr>
+        <p:blipFill>
+          <a:blip r:embed="rId3"/>
+          <a:stretch>
+            <a:fillRect/>
+          </a:stretch>
+        </p:blipFill>
+        <p:spPr>
+          <a:xfrm>
+            <a:off x="6362700" y="2185539"/>
+            <a:ext cx="5524500" cy="3253693"/>
+          </a:xfrm>
+          <a:prstGeom prst="rect">
+            <a:avLst/>
+          </a:prstGeom>
+        </p:spPr>
+      </p:pic>
+      <p:sp>
+        <p:nvSpPr>
+          <p:cNvPr id="6" name="文本框 5"/>
+          <p:cNvSpPr txBox="1"/>
+          <p:nvPr/>
+        </p:nvSpPr>
+        <p:spPr>
+          <a:xfrm>
+            <a:off x="2477620" y="1781432"/>
+            <a:ext cx="1569660" cy="369332"/>
+          </a:xfrm>
+          <a:prstGeom prst="rect">
+            <a:avLst/>
+          </a:prstGeom>
+          <a:noFill/>
+        </p:spPr>
+        <p:txBody>
+          <a:bodyPr wrap="none" rtlCol="0">
+            <a:spAutoFit/>
+          </a:bodyPr>
+          <a:lstStyle/>
+          <a:p>
+            <a:r>
+              <a:rPr lang="zh-CN" altLang="en-US" dirty="0" smtClean="0"/>
+              <a:t>线性模型仿真</a:t>
+            </a:r>
+            <a:endParaRPr lang="zh-CN" altLang="en-US" dirty="0"/>
+          </a:p>
+        </p:txBody>
+      </p:sp>
+      <p:sp>
+        <p:nvSpPr>
+          <p:cNvPr id="7" name="文本框 6"/>
+          <p:cNvSpPr txBox="1"/>
+          <p:nvPr/>
+        </p:nvSpPr>
+        <p:spPr>
+          <a:xfrm>
+            <a:off x="8075875" y="1574800"/>
+            <a:ext cx="1800493" cy="369332"/>
+          </a:xfrm>
+          <a:prstGeom prst="rect">
+            <a:avLst/>
+          </a:prstGeom>
+          <a:noFill/>
+        </p:spPr>
+        <p:txBody>
+          <a:bodyPr wrap="none" rtlCol="0">
+            <a:spAutoFit/>
+          </a:bodyPr>
+          <a:lstStyle/>
+          <a:p>
+            <a:r>
+              <a:rPr lang="zh-CN" altLang="en-US" dirty="0" smtClean="0"/>
+              <a:t>非线性模型仿真</a:t>
+            </a:r>
+            <a:endParaRPr lang="zh-CN" altLang="en-US" dirty="0"/>
+          </a:p>
+        </p:txBody>
+      </p:sp>
+      <mc:AlternateContent xmlns:mc="http://schemas.openxmlformats.org/markup-compatibility/2006">
+        <mc:Choice xmlns:a14="http://schemas.microsoft.com/office/drawing/2010/main" Requires="a14">
+          <p:sp>
+            <p:nvSpPr>
+              <p:cNvPr id="8" name="文本框 7"/>
+              <p:cNvSpPr txBox="1"/>
+              <p:nvPr/>
+            </p:nvSpPr>
+            <p:spPr>
+              <a:xfrm>
+                <a:off x="7493760" y="5697034"/>
+                <a:ext cx="3657220" cy="369332"/>
+              </a:xfrm>
+              <a:prstGeom prst="rect">
+                <a:avLst/>
+              </a:prstGeom>
+              <a:noFill/>
+            </p:spPr>
+            <p:txBody>
+              <a:bodyPr wrap="none" rtlCol="0">
+                <a:spAutoFit/>
+              </a:bodyPr>
+              <a:lstStyle/>
+              <a:p>
+                <a:r>
+                  <a:rPr lang="zh-CN" altLang="en-US" dirty="0" smtClean="0"/>
+                  <a:t>示波器结果：左上</a:t>
+                </a:r>
+                <a:r>
+                  <a:rPr lang="en-US" altLang="zh-CN" dirty="0" smtClean="0"/>
+                  <a:t>-</a:t>
+                </a:r>
+                <a14:m>
+                  <m:oMath xmlns:m="http://schemas.openxmlformats.org/officeDocument/2006/math">
+                    <m:r>
+                      <a:rPr lang="en-US" altLang="zh-CN" b="0" i="1" smtClean="0">
+                        <a:latin typeface="Cambria Math" panose="02040503050406030204" pitchFamily="18" charset="0"/>
+                      </a:rPr>
+                      <m:t>𝜃</m:t>
+                    </m:r>
+                  </m:oMath>
+                </a14:m>
+                <a:r>
+                  <a:rPr lang="en-US" altLang="zh-CN" dirty="0" smtClean="0"/>
+                  <a:t>,</a:t>
+                </a:r>
+                <a:r>
+                  <a:rPr lang="zh-CN" altLang="en-US" dirty="0" smtClean="0"/>
+                  <a:t>左下</a:t>
+                </a:r>
+                <a:r>
+                  <a:rPr lang="en-US" altLang="zh-CN" dirty="0" smtClean="0"/>
+                  <a:t>-</a:t>
+                </a:r>
+                <a14:m>
+                  <m:oMath xmlns:m="http://schemas.openxmlformats.org/officeDocument/2006/math">
+                    <m:r>
+                      <a:rPr lang="en-US" altLang="zh-CN" b="0" i="1" smtClean="0">
+                        <a:latin typeface="Cambria Math" panose="02040503050406030204" pitchFamily="18" charset="0"/>
+                      </a:rPr>
+                      <m:t>𝜙</m:t>
+                    </m:r>
+                  </m:oMath>
+                </a14:m>
+                <a:r>
+                  <a:rPr lang="zh-CN" altLang="en-US" dirty="0" smtClean="0"/>
+                  <a:t>，下同</a:t>
+                </a:r>
+                <a:endParaRPr lang="zh-CN" altLang="en-US" dirty="0"/>
+              </a:p>
+            </p:txBody>
+          </p:sp>
+        </mc:Choice>
+        <mc:Fallback>
+          <p:sp>
+            <p:nvSpPr>
+              <p:cNvPr id="8" name="文本框 7"/>
+              <p:cNvSpPr txBox="1">
+                <a:spLocks noRot="1" noChangeAspect="1" noMove="1" noResize="1" noEditPoints="1" noAdjustHandles="1" noChangeArrowheads="1" noChangeShapeType="1" noTextEdit="1"/>
+              </p:cNvSpPr>
+              <p:nvPr/>
+            </p:nvSpPr>
+            <p:spPr>
+              <a:xfrm>
+                <a:off x="7493760" y="5697034"/>
+                <a:ext cx="3657220" cy="369332"/>
+              </a:xfrm>
+              <a:prstGeom prst="rect">
+                <a:avLst/>
+              </a:prstGeom>
+              <a:blipFill rotWithShape="0">
+                <a:blip r:embed="rId4"/>
+                <a:stretch>
+                  <a:fillRect l="-1333" t="-11667" r="-1000" b="-28333"/>
+                </a:stretch>
+              </a:blipFill>
+            </p:spPr>
+            <p:txBody>
+              <a:bodyPr/>
+              <a:lstStyle/>
+              <a:p>
+                <a:r>
+                  <a:rPr lang="zh-CN" altLang="en-US">
+                    <a:noFill/>
+                  </a:rPr>
+                  <a:t> </a:t>
+                </a:r>
+              </a:p>
+            </p:txBody>
+          </p:sp>
+        </mc:Fallback>
+      </mc:AlternateContent>
+      <mc:AlternateContent xmlns:mc="http://schemas.openxmlformats.org/markup-compatibility/2006">
+        <mc:Choice xmlns:a14="http://schemas.microsoft.com/office/drawing/2010/main" Requires="a14">
+          <p:sp>
+            <p:nvSpPr>
+              <p:cNvPr id="9" name="文本框 8"/>
+              <p:cNvSpPr txBox="1"/>
+              <p:nvPr/>
+            </p:nvSpPr>
+            <p:spPr>
+              <a:xfrm>
+                <a:off x="1780089" y="5696234"/>
+                <a:ext cx="3657220" cy="369332"/>
+              </a:xfrm>
+              <a:prstGeom prst="rect">
+                <a:avLst/>
+              </a:prstGeom>
+              <a:noFill/>
+            </p:spPr>
+            <p:txBody>
+              <a:bodyPr wrap="none" rtlCol="0">
+                <a:spAutoFit/>
+              </a:bodyPr>
+              <a:lstStyle/>
+              <a:p>
+                <a:r>
+                  <a:rPr lang="zh-CN" altLang="en-US" dirty="0" smtClean="0"/>
+                  <a:t>示波器结果：</a:t>
+                </a:r>
+                <a:r>
+                  <a:rPr lang="zh-CN" altLang="en-US" dirty="0"/>
+                  <a:t>蓝色</a:t>
+                </a:r>
+                <a:r>
+                  <a:rPr lang="en-US" altLang="zh-CN" dirty="0" smtClean="0"/>
+                  <a:t>-</a:t>
+                </a:r>
+                <a14:m>
+                  <m:oMath xmlns:m="http://schemas.openxmlformats.org/officeDocument/2006/math">
+                    <m:r>
+                      <a:rPr lang="en-US" altLang="zh-CN" b="0" i="1" smtClean="0">
+                        <a:latin typeface="Cambria Math" panose="02040503050406030204" pitchFamily="18" charset="0"/>
+                      </a:rPr>
+                      <m:t>𝜃</m:t>
+                    </m:r>
+                  </m:oMath>
+                </a14:m>
+                <a:r>
+                  <a:rPr lang="en-US" altLang="zh-CN" dirty="0" smtClean="0"/>
+                  <a:t>,</a:t>
+                </a:r>
+                <a:r>
+                  <a:rPr lang="zh-CN" altLang="en-US" dirty="0"/>
+                  <a:t>红色</a:t>
+                </a:r>
+                <a:r>
+                  <a:rPr lang="en-US" altLang="zh-CN" dirty="0" smtClean="0"/>
+                  <a:t>-</a:t>
+                </a:r>
+                <a14:m>
+                  <m:oMath xmlns:m="http://schemas.openxmlformats.org/officeDocument/2006/math">
+                    <m:r>
+                      <a:rPr lang="en-US" altLang="zh-CN" b="0" i="1" smtClean="0">
+                        <a:latin typeface="Cambria Math" panose="02040503050406030204" pitchFamily="18" charset="0"/>
+                      </a:rPr>
+                      <m:t>𝜙</m:t>
+                    </m:r>
+                  </m:oMath>
+                </a14:m>
+                <a:r>
+                  <a:rPr lang="zh-CN" altLang="en-US" dirty="0" smtClean="0"/>
+                  <a:t>，下同</a:t>
+                </a:r>
+                <a:endParaRPr lang="zh-CN" altLang="en-US" dirty="0"/>
+              </a:p>
+            </p:txBody>
+          </p:sp>
+        </mc:Choice>
+        <mc:Fallback>
+          <p:sp>
+            <p:nvSpPr>
+              <p:cNvPr id="9" name="文本框 8"/>
+              <p:cNvSpPr txBox="1">
+                <a:spLocks noRot="1" noChangeAspect="1" noMove="1" noResize="1" noEditPoints="1" noAdjustHandles="1" noChangeArrowheads="1" noChangeShapeType="1" noTextEdit="1"/>
+              </p:cNvSpPr>
+              <p:nvPr/>
+            </p:nvSpPr>
+            <p:spPr>
+              <a:xfrm>
+                <a:off x="1780089" y="5696234"/>
+                <a:ext cx="3657220" cy="369332"/>
+              </a:xfrm>
+              <a:prstGeom prst="rect">
+                <a:avLst/>
+              </a:prstGeom>
+              <a:blipFill rotWithShape="0">
+                <a:blip r:embed="rId5"/>
+                <a:stretch>
+                  <a:fillRect l="-1333" t="-9836" r="-1000" b="-26230"/>
+                </a:stretch>
+              </a:blipFill>
+            </p:spPr>
+            <p:txBody>
+              <a:bodyPr/>
+              <a:lstStyle/>
+              <a:p>
+                <a:r>
+                  <a:rPr lang="zh-CN" altLang="en-US">
+                    <a:noFill/>
+                  </a:rPr>
+                  <a:t> </a:t>
+                </a:r>
+              </a:p>
+            </p:txBody>
+          </p:sp>
+        </mc:Fallback>
+      </mc:AlternateContent>
+    </p:spTree>
+    <p:extLst>
+      <p:ext uri="{BB962C8B-B14F-4D97-AF65-F5344CB8AC3E}">
+        <p14:creationId xmlns:p14="http://schemas.microsoft.com/office/powerpoint/2010/main" val="180636909"/>
+      </p:ext>
+    </p:extLst>
+  </p:cSld>
+  <p:clrMapOvr>
+    <a:masterClrMapping/>
+  </p:clrMapOvr>
+  <p:timing>
+    <p:tnLst>
+      <p:par>
+        <p:cTn id="1" dur="indefinite" restart="never" nodeType="tmRoot"/>
+      </p:par>
+    </p:tnLst>
+  </p:timing>
+</p:sld>
+</file>
+
+<file path=ppt/slides/slide11.xml><?xml version="1.0" encoding="utf-8"?>
+<p:sld xmlns:a="http://schemas.openxmlformats.org/drawingml/2006/main" xmlns:r="http://schemas.openxmlformats.org/officeDocument/2006/relationships" xmlns:p="http://schemas.openxmlformats.org/presentationml/2006/main">
+  <p:cSld>
+    <p:spTree>
+      <p:nvGrpSpPr>
+        <p:cNvPr id="1" name=""/>
+        <p:cNvGrpSpPr/>
+        <p:nvPr/>
+      </p:nvGrpSpPr>
+      <p:grpSpPr>
+        <a:xfrm>
+          <a:off x="0" y="0"/>
+          <a:ext cx="0" cy="0"/>
+          <a:chOff x="0" y="0"/>
+          <a:chExt cx="0" cy="0"/>
+        </a:xfrm>
+      </p:grpSpPr>
+      <p:sp>
+        <p:nvSpPr>
+          <p:cNvPr id="2" name="标题 1"/>
+          <p:cNvSpPr>
+            <a:spLocks noGrp="1"/>
+          </p:cNvSpPr>
+          <p:nvPr>
+            <p:ph type="title"/>
+          </p:nvPr>
+        </p:nvSpPr>
+        <p:spPr>
+          <a:xfrm>
+            <a:off x="1371600" y="178370"/>
+            <a:ext cx="9601200" cy="753533"/>
+          </a:xfrm>
+        </p:spPr>
+        <p:txBody>
+          <a:bodyPr/>
+          <a:lstStyle/>
+          <a:p>
+            <a:r>
+              <a:rPr kumimoji="1" lang="zh-CN" altLang="en-US" b="1" dirty="0" smtClean="0"/>
+              <a:t>状态反馈控制</a:t>
+            </a:r>
+            <a:r>
+              <a:rPr kumimoji="1" lang="en-US" altLang="zh-CN" b="1" dirty="0" smtClean="0"/>
+              <a:t>-</a:t>
+            </a:r>
+            <a:r>
+              <a:rPr kumimoji="1" lang="zh-CN" altLang="en-US" b="1" dirty="0" smtClean="0"/>
+              <a:t>仿真</a:t>
+            </a:r>
+            <a:endParaRPr kumimoji="1" lang="zh-CN" altLang="en-US" b="1" dirty="0"/>
+          </a:p>
+        </p:txBody>
+      </p:sp>
+      <p:sp>
+        <p:nvSpPr>
+          <p:cNvPr id="3" name="内容占位符 2"/>
+          <p:cNvSpPr>
+            <a:spLocks noGrp="1"/>
+          </p:cNvSpPr>
+          <p:nvPr>
+            <p:ph idx="1"/>
+          </p:nvPr>
+        </p:nvSpPr>
+        <p:spPr>
+          <a:xfrm>
+            <a:off x="1371600" y="965199"/>
+            <a:ext cx="9601200" cy="609601"/>
+          </a:xfrm>
+        </p:spPr>
+        <p:txBody>
+          <a:bodyPr>
+            <a:normAutofit/>
+          </a:bodyPr>
+          <a:lstStyle/>
+          <a:p>
+            <a:r>
+              <a:rPr kumimoji="1" lang="en-US" altLang="zh-CN" b="1" dirty="0" smtClean="0"/>
+              <a:t>Simulink</a:t>
+            </a:r>
+            <a:r>
+              <a:rPr kumimoji="1" lang="zh-CN" altLang="en-US" b="1" dirty="0" smtClean="0"/>
+              <a:t>模型斜坡</a:t>
+            </a:r>
+            <a:r>
+              <a:rPr kumimoji="1" lang="zh-CN" altLang="en-US" b="1" dirty="0" smtClean="0"/>
+              <a:t>输入</a:t>
+            </a:r>
+            <a:r>
+              <a:rPr kumimoji="1" lang="en-US" altLang="zh-CN" b="1" dirty="0" smtClean="0"/>
+              <a:t>——</a:t>
+            </a:r>
+            <a:r>
+              <a:rPr kumimoji="1" lang="zh-CN" altLang="en-US" b="1" dirty="0" smtClean="0"/>
+              <a:t>车体基本不偏转，车身速度以理想情况基本跟随输入</a:t>
+            </a:r>
+            <a:endParaRPr kumimoji="1" lang="en-US" altLang="zh-CN" b="1" dirty="0" smtClean="0"/>
+          </a:p>
+          <a:p>
+            <a:pPr marL="0" indent="0">
+              <a:buNone/>
+            </a:pPr>
+            <a:endParaRPr kumimoji="1" lang="en-US" altLang="zh-CN" b="1" dirty="0" smtClean="0"/>
+          </a:p>
+        </p:txBody>
+      </p:sp>
+      <p:pic>
+        <p:nvPicPr>
+          <p:cNvPr id="4" name="图片 3"/>
+          <p:cNvPicPr>
+            <a:picLocks noChangeAspect="1"/>
+          </p:cNvPicPr>
+          <p:nvPr/>
+        </p:nvPicPr>
+        <p:blipFill>
+          <a:blip r:embed="rId2">
+            <a:extLst>
+              <a:ext uri="{28A0092B-C50C-407E-A947-70E740481C1C}">
+                <a14:useLocalDpi xmlns:a14="http://schemas.microsoft.com/office/drawing/2010/main" val="0"/>
+              </a:ext>
+            </a:extLst>
+          </a:blip>
+          <a:stretch>
+            <a:fillRect/>
+          </a:stretch>
+        </p:blipFill>
+        <p:spPr>
+          <a:xfrm>
+            <a:off x="1488800" y="2413000"/>
+            <a:ext cx="3998933" cy="2999200"/>
+          </a:xfrm>
+          <a:prstGeom prst="rect">
+            <a:avLst/>
+          </a:prstGeom>
+        </p:spPr>
+      </p:pic>
+      <p:pic>
+        <p:nvPicPr>
+          <p:cNvPr id="5" name="图片 4"/>
+          <p:cNvPicPr>
+            <a:picLocks noChangeAspect="1"/>
+          </p:cNvPicPr>
+          <p:nvPr/>
+        </p:nvPicPr>
+        <p:blipFill>
+          <a:blip r:embed="rId3"/>
+          <a:stretch>
+            <a:fillRect/>
+          </a:stretch>
+        </p:blipFill>
+        <p:spPr>
+          <a:xfrm>
+            <a:off x="6309916" y="2413000"/>
+            <a:ext cx="5437584" cy="3202504"/>
+          </a:xfrm>
+          <a:prstGeom prst="rect">
+            <a:avLst/>
+          </a:prstGeom>
+        </p:spPr>
+      </p:pic>
+      <p:sp>
+        <p:nvSpPr>
+          <p:cNvPr id="6" name="文本框 5"/>
+          <p:cNvSpPr txBox="1"/>
+          <p:nvPr/>
+        </p:nvSpPr>
+        <p:spPr>
+          <a:xfrm>
+            <a:off x="2477620" y="1781432"/>
+            <a:ext cx="1569660" cy="369332"/>
+          </a:xfrm>
+          <a:prstGeom prst="rect">
+            <a:avLst/>
+          </a:prstGeom>
+          <a:noFill/>
+        </p:spPr>
+        <p:txBody>
+          <a:bodyPr wrap="none" rtlCol="0">
+            <a:spAutoFit/>
+          </a:bodyPr>
+          <a:lstStyle/>
+          <a:p>
+            <a:r>
+              <a:rPr lang="zh-CN" altLang="en-US" dirty="0" smtClean="0"/>
+              <a:t>线性模型仿真</a:t>
+            </a:r>
+            <a:endParaRPr lang="zh-CN" altLang="en-US" dirty="0"/>
+          </a:p>
+        </p:txBody>
+      </p:sp>
+      <p:sp>
+        <p:nvSpPr>
+          <p:cNvPr id="7" name="文本框 6"/>
+          <p:cNvSpPr txBox="1"/>
+          <p:nvPr/>
+        </p:nvSpPr>
+        <p:spPr>
+          <a:xfrm>
+            <a:off x="8075875" y="1781432"/>
+            <a:ext cx="1800493" cy="369332"/>
+          </a:xfrm>
+          <a:prstGeom prst="rect">
+            <a:avLst/>
+          </a:prstGeom>
+          <a:noFill/>
+        </p:spPr>
+        <p:txBody>
+          <a:bodyPr wrap="none" rtlCol="0">
+            <a:spAutoFit/>
+          </a:bodyPr>
+          <a:lstStyle/>
+          <a:p>
+            <a:r>
+              <a:rPr lang="zh-CN" altLang="en-US" dirty="0" smtClean="0"/>
+              <a:t>非线性模型仿真</a:t>
+            </a:r>
+            <a:endParaRPr lang="zh-CN" altLang="en-US" dirty="0"/>
+          </a:p>
+        </p:txBody>
+      </p:sp>
+    </p:spTree>
+    <p:extLst>
+      <p:ext uri="{BB962C8B-B14F-4D97-AF65-F5344CB8AC3E}">
+        <p14:creationId xmlns:p14="http://schemas.microsoft.com/office/powerpoint/2010/main" val="660045937"/>
+      </p:ext>
+    </p:extLst>
+  </p:cSld>
+  <p:clrMapOvr>
+    <a:masterClrMapping/>
+  </p:clrMapOvr>
+  <p:timing>
+    <p:tnLst>
+      <p:par>
+        <p:cTn id="1" dur="indefinite" restart="never" nodeType="tmRoot"/>
+      </p:par>
+    </p:tnLst>
+  </p:timing>
+</p:sld>
+</file>
+
+<file path=ppt/slides/slide12.xml><?xml version="1.0" encoding="utf-8"?>
+<p:sld xmlns:a="http://schemas.openxmlformats.org/drawingml/2006/main" xmlns:r="http://schemas.openxmlformats.org/officeDocument/2006/relationships" xmlns:p="http://schemas.openxmlformats.org/presentationml/2006/main">
+  <p:cSld>
+    <p:spTree>
+      <p:nvGrpSpPr>
+        <p:cNvPr id="1" name=""/>
+        <p:cNvGrpSpPr/>
+        <p:nvPr/>
+      </p:nvGrpSpPr>
+      <p:grpSpPr>
+        <a:xfrm>
+          <a:off x="0" y="0"/>
+          <a:ext cx="0" cy="0"/>
+          <a:chOff x="0" y="0"/>
+          <a:chExt cx="0" cy="0"/>
+        </a:xfrm>
+      </p:grpSpPr>
+      <p:sp>
+        <p:nvSpPr>
+          <p:cNvPr id="2" name="标题 1"/>
+          <p:cNvSpPr>
+            <a:spLocks noGrp="1"/>
+          </p:cNvSpPr>
+          <p:nvPr>
+            <p:ph type="title"/>
+          </p:nvPr>
+        </p:nvSpPr>
+        <p:spPr>
+          <a:xfrm>
+            <a:off x="1371600" y="178370"/>
+            <a:ext cx="9601200" cy="753533"/>
+          </a:xfrm>
+        </p:spPr>
+        <p:txBody>
+          <a:bodyPr/>
+          <a:lstStyle/>
+          <a:p>
+            <a:r>
+              <a:rPr kumimoji="1" lang="zh-CN" altLang="en-US" b="1" dirty="0" smtClean="0"/>
+              <a:t>状态反馈控制</a:t>
+            </a:r>
+            <a:r>
+              <a:rPr kumimoji="1" lang="en-US" altLang="zh-CN" b="1" dirty="0" smtClean="0"/>
+              <a:t>-</a:t>
+            </a:r>
+            <a:r>
+              <a:rPr kumimoji="1" lang="zh-CN" altLang="en-US" b="1" dirty="0" smtClean="0"/>
+              <a:t>仿真</a:t>
+            </a:r>
+            <a:endParaRPr kumimoji="1" lang="zh-CN" altLang="en-US" b="1" dirty="0"/>
+          </a:p>
+        </p:txBody>
+      </p:sp>
+      <p:sp>
+        <p:nvSpPr>
+          <p:cNvPr id="3" name="内容占位符 2"/>
+          <p:cNvSpPr>
+            <a:spLocks noGrp="1"/>
+          </p:cNvSpPr>
+          <p:nvPr>
+            <p:ph idx="1"/>
+          </p:nvPr>
+        </p:nvSpPr>
+        <p:spPr>
+          <a:xfrm>
+            <a:off x="1371600" y="965199"/>
+            <a:ext cx="9601200" cy="609601"/>
+          </a:xfrm>
+        </p:spPr>
+        <p:txBody>
+          <a:bodyPr>
+            <a:normAutofit/>
+          </a:bodyPr>
+          <a:lstStyle/>
+          <a:p>
+            <a:r>
+              <a:rPr kumimoji="1" lang="en-US" altLang="zh-CN" b="1" dirty="0" smtClean="0"/>
+              <a:t>Simulink</a:t>
+            </a:r>
+            <a:r>
+              <a:rPr kumimoji="1" lang="zh-CN" altLang="en-US" b="1" dirty="0" smtClean="0"/>
+              <a:t>模型加速度</a:t>
+            </a:r>
+            <a:r>
+              <a:rPr kumimoji="1" lang="zh-CN" altLang="en-US" b="1" dirty="0" smtClean="0"/>
+              <a:t>输入</a:t>
+            </a:r>
+            <a:r>
+              <a:rPr kumimoji="1" lang="en-US" altLang="zh-CN" b="1" dirty="0" smtClean="0"/>
+              <a:t>——</a:t>
+            </a:r>
+            <a:r>
+              <a:rPr kumimoji="1" lang="zh-CN" altLang="en-US" b="1" dirty="0" smtClean="0"/>
+              <a:t>车身保持一定的倾角，车体加速度与输入基本一致</a:t>
+            </a:r>
+            <a:endParaRPr kumimoji="1" lang="en-US" altLang="zh-CN" b="1" dirty="0" smtClean="0"/>
+          </a:p>
+          <a:p>
+            <a:pPr marL="0" indent="0">
+              <a:buNone/>
+            </a:pPr>
+            <a:endParaRPr kumimoji="1" lang="en-US" altLang="zh-CN" b="1" dirty="0" smtClean="0"/>
+          </a:p>
+        </p:txBody>
+      </p:sp>
+      <p:pic>
+        <p:nvPicPr>
+          <p:cNvPr id="5" name="图片 4"/>
+          <p:cNvPicPr>
+            <a:picLocks noChangeAspect="1"/>
+          </p:cNvPicPr>
+          <p:nvPr/>
+        </p:nvPicPr>
+        <p:blipFill>
+          <a:blip r:embed="rId2">
+            <a:extLst>
+              <a:ext uri="{28A0092B-C50C-407E-A947-70E740481C1C}">
+                <a14:useLocalDpi xmlns:a14="http://schemas.microsoft.com/office/drawing/2010/main" val="0"/>
+              </a:ext>
+            </a:extLst>
+          </a:blip>
+          <a:stretch>
+            <a:fillRect/>
+          </a:stretch>
+        </p:blipFill>
+        <p:spPr>
+          <a:xfrm>
+            <a:off x="1314450" y="2509796"/>
+            <a:ext cx="3896000" cy="2922000"/>
+          </a:xfrm>
+          <a:prstGeom prst="rect">
+            <a:avLst/>
+          </a:prstGeom>
+        </p:spPr>
+      </p:pic>
+      <p:sp>
+        <p:nvSpPr>
+          <p:cNvPr id="6" name="文本框 5"/>
+          <p:cNvSpPr txBox="1"/>
+          <p:nvPr/>
+        </p:nvSpPr>
+        <p:spPr>
+          <a:xfrm>
+            <a:off x="2477620" y="1781432"/>
+            <a:ext cx="1569660" cy="369332"/>
+          </a:xfrm>
+          <a:prstGeom prst="rect">
+            <a:avLst/>
+          </a:prstGeom>
+          <a:noFill/>
+        </p:spPr>
+        <p:txBody>
+          <a:bodyPr wrap="none" rtlCol="0">
+            <a:spAutoFit/>
+          </a:bodyPr>
+          <a:lstStyle/>
+          <a:p>
+            <a:r>
+              <a:rPr lang="zh-CN" altLang="en-US" dirty="0" smtClean="0"/>
+              <a:t>线性模型仿真</a:t>
+            </a:r>
+            <a:endParaRPr lang="zh-CN" altLang="en-US" dirty="0"/>
+          </a:p>
+        </p:txBody>
+      </p:sp>
+      <p:sp>
+        <p:nvSpPr>
+          <p:cNvPr id="7" name="文本框 6"/>
+          <p:cNvSpPr txBox="1"/>
+          <p:nvPr/>
+        </p:nvSpPr>
+        <p:spPr>
+          <a:xfrm>
+            <a:off x="8075875" y="1781432"/>
+            <a:ext cx="1800493" cy="369332"/>
+          </a:xfrm>
+          <a:prstGeom prst="rect">
+            <a:avLst/>
+          </a:prstGeom>
+          <a:noFill/>
+        </p:spPr>
+        <p:txBody>
+          <a:bodyPr wrap="none" rtlCol="0">
+            <a:spAutoFit/>
+          </a:bodyPr>
+          <a:lstStyle/>
+          <a:p>
+            <a:r>
+              <a:rPr lang="zh-CN" altLang="en-US" dirty="0" smtClean="0"/>
+              <a:t>非线性模型仿真</a:t>
+            </a:r>
+            <a:endParaRPr lang="zh-CN" altLang="en-US" dirty="0"/>
+          </a:p>
+        </p:txBody>
+      </p:sp>
+      <p:pic>
+        <p:nvPicPr>
+          <p:cNvPr id="4" name="图片 3"/>
+          <p:cNvPicPr>
+            <a:picLocks noChangeAspect="1"/>
+          </p:cNvPicPr>
+          <p:nvPr/>
+        </p:nvPicPr>
+        <p:blipFill>
+          <a:blip r:embed="rId3"/>
+          <a:stretch>
+            <a:fillRect/>
+          </a:stretch>
+        </p:blipFill>
+        <p:spPr>
+          <a:xfrm>
+            <a:off x="6172200" y="2509796"/>
+            <a:ext cx="5735902" cy="3378200"/>
+          </a:xfrm>
+          <a:prstGeom prst="rect">
+            <a:avLst/>
+          </a:prstGeom>
+        </p:spPr>
+      </p:pic>
+    </p:spTree>
+    <p:extLst>
+      <p:ext uri="{BB962C8B-B14F-4D97-AF65-F5344CB8AC3E}">
+        <p14:creationId xmlns:p14="http://schemas.microsoft.com/office/powerpoint/2010/main" val="1326850230"/>
+      </p:ext>
+    </p:extLst>
+  </p:cSld>
+  <p:clrMapOvr>
+    <a:masterClrMapping/>
+  </p:clrMapOvr>
+  <p:timing>
+    <p:tnLst>
+      <p:par>
+        <p:cTn id="1" dur="indefinite" restart="never" nodeType="tmRoot"/>
+      </p:par>
+    </p:tnLst>
+  </p:timing>
+</p:sld>
+</file>
+
 <file path=ppt/slides/slide2.xml><?xml version="1.0" encoding="utf-8"?>
 <p:sld xmlns:a="http://schemas.openxmlformats.org/drawingml/2006/main" xmlns:r="http://schemas.openxmlformats.org/officeDocument/2006/relationships" xmlns:p="http://schemas.openxmlformats.org/presentationml/2006/main">
   <p:cSld>
@@ -4514,7 +5465,7 @@
                       <m:sSubPr>
                         <m:ctrlPr>
                           <a:rPr lang="zh-CN" altLang="zh-CN" sz="1600" i="1">
-                            <a:latin typeface="Cambria Math" charset="0"/>
+                            <a:latin typeface="Cambria Math" panose="02040503050406030204" pitchFamily="18" charset="0"/>
                           </a:rPr>
                         </m:ctrlPr>
                       </m:sSubPr>
@@ -4579,7 +5530,7 @@
                         <m:chr m:val="̇"/>
                         <m:ctrlPr>
                           <a:rPr lang="en-US" altLang="zh-CN" sz="1600" b="0" i="1" smtClean="0">
-                            <a:latin typeface="Cambria Math" charset="0"/>
+                            <a:latin typeface="Cambria Math" panose="02040503050406030204" pitchFamily="18" charset="0"/>
                           </a:rPr>
                         </m:ctrlPr>
                       </m:accPr>
@@ -4620,7 +5571,7 @@
                       <m:sSubPr>
                         <m:ctrlPr>
                           <a:rPr lang="en-US" altLang="zh-CN" sz="1600" b="0" i="1" smtClean="0">
-                            <a:latin typeface="Cambria Math" charset="0"/>
+                            <a:latin typeface="Cambria Math" panose="02040503050406030204" pitchFamily="18" charset="0"/>
                           </a:rPr>
                         </m:ctrlPr>
                       </m:sSubPr>
@@ -4657,7 +5608,7 @@
                       <m:sSubPr>
                         <m:ctrlPr>
                           <a:rPr lang="en-US" altLang="zh-CN" sz="1600" b="0" i="1" smtClean="0">
-                            <a:latin typeface="Cambria Math" charset="0"/>
+                            <a:latin typeface="Cambria Math" panose="02040503050406030204" pitchFamily="18" charset="0"/>
                           </a:rPr>
                         </m:ctrlPr>
                       </m:sSubPr>
@@ -4718,7 +5669,7 @@
                           <m:endChr m:val=""/>
                           <m:ctrlPr>
                             <a:rPr lang="zh-CN" altLang="zh-CN" sz="1600" i="1">
-                              <a:latin typeface="Cambria Math" charset="0"/>
+                              <a:latin typeface="Cambria Math" panose="02040503050406030204" pitchFamily="18" charset="0"/>
                             </a:rPr>
                           </m:ctrlPr>
                         </m:dPr>
@@ -4727,7 +5678,7 @@
                             <m:eqArrPr>
                               <m:ctrlPr>
                                 <a:rPr lang="zh-CN" altLang="zh-CN" sz="1600" i="1">
-                                  <a:latin typeface="Cambria Math" charset="0"/>
+                                  <a:latin typeface="Cambria Math" panose="02040503050406030204" pitchFamily="18" charset="0"/>
                                 </a:rPr>
                               </m:ctrlPr>
                             </m:eqArrPr>
@@ -4742,7 +5693,7 @@
                                 <m:sSubPr>
                                   <m:ctrlPr>
                                     <a:rPr lang="zh-CN" altLang="zh-CN" sz="1600" i="1">
-                                      <a:latin typeface="Cambria Math" charset="0"/>
+                                      <a:latin typeface="Cambria Math" panose="02040503050406030204" pitchFamily="18" charset="0"/>
                                     </a:rPr>
                                   </m:ctrlPr>
                                 </m:sSubPr>
@@ -4768,7 +5719,7 @@
                                   <m:chr m:val="̈"/>
                                   <m:ctrlPr>
                                     <a:rPr lang="zh-CN" altLang="zh-CN" sz="1600" i="1">
-                                      <a:latin typeface="Cambria Math" charset="0"/>
+                                      <a:latin typeface="Cambria Math" panose="02040503050406030204" pitchFamily="18" charset="0"/>
                                     </a:rPr>
                                   </m:ctrlPr>
                                 </m:accPr>
@@ -4803,7 +5754,7 @@
                                 <m:sSubPr>
                                   <m:ctrlPr>
                                     <a:rPr lang="zh-CN" altLang="zh-CN" sz="1600" i="1">
-                                      <a:latin typeface="Cambria Math" charset="0"/>
+                                      <a:latin typeface="Cambria Math" panose="02040503050406030204" pitchFamily="18" charset="0"/>
                                     </a:rPr>
                                   </m:ctrlPr>
                                 </m:sSubPr>
@@ -4847,7 +5798,7 @@
                                   <m:chr m:val="̇"/>
                                   <m:ctrlPr>
                                     <a:rPr lang="zh-CN" altLang="zh-CN" sz="1600" i="1">
-                                      <a:latin typeface="Cambria Math" charset="0"/>
+                                      <a:latin typeface="Cambria Math" panose="02040503050406030204" pitchFamily="18" charset="0"/>
                                     </a:rPr>
                                   </m:ctrlPr>
                                 </m:accPr>
@@ -4872,7 +5823,7 @@
                                 <m:sSubPr>
                                   <m:ctrlPr>
                                     <a:rPr lang="zh-CN" altLang="zh-CN" sz="1600" i="1">
-                                      <a:latin typeface="Cambria Math" charset="0"/>
+                                      <a:latin typeface="Cambria Math" panose="02040503050406030204" pitchFamily="18" charset="0"/>
                                     </a:rPr>
                                   </m:ctrlPr>
                                 </m:sSubPr>
@@ -4898,7 +5849,7 @@
                                   <m:chr m:val="̈"/>
                                   <m:ctrlPr>
                                     <a:rPr lang="zh-CN" altLang="zh-CN" sz="1600" i="1">
-                                      <a:latin typeface="Cambria Math" charset="0"/>
+                                      <a:latin typeface="Cambria Math" panose="02040503050406030204" pitchFamily="18" charset="0"/>
                                     </a:rPr>
                                   </m:ctrlPr>
                                 </m:accPr>
@@ -4921,7 +5872,7 @@
                                 <m:sSubPr>
                                   <m:ctrlPr>
                                     <a:rPr lang="zh-CN" altLang="zh-CN" sz="1600" i="1">
-                                      <a:latin typeface="Cambria Math" charset="0"/>
+                                      <a:latin typeface="Cambria Math" panose="02040503050406030204" pitchFamily="18" charset="0"/>
                                     </a:rPr>
                                   </m:ctrlPr>
                                 </m:sSubPr>
@@ -4952,7 +5903,7 @@
                                 <m:sSubPr>
                                   <m:ctrlPr>
                                     <a:rPr lang="zh-CN" altLang="zh-CN" sz="1600" i="1">
-                                      <a:latin typeface="Cambria Math" charset="0"/>
+                                      <a:latin typeface="Cambria Math" panose="02040503050406030204" pitchFamily="18" charset="0"/>
                                     </a:rPr>
                                   </m:ctrlPr>
                                 </m:sSubPr>
@@ -5055,7 +6006,7 @@
                       <m:sSubPr>
                         <m:ctrlPr>
                           <a:rPr lang="zh-CN" altLang="zh-CN" sz="1600" i="1">
-                            <a:latin typeface="Cambria Math" charset="0"/>
+                            <a:latin typeface="Cambria Math" panose="02040503050406030204" pitchFamily="18" charset="0"/>
                           </a:rPr>
                         </m:ctrlPr>
                       </m:sSubPr>
@@ -5126,7 +6077,7 @@
                           <m:endChr m:val=""/>
                           <m:ctrlPr>
                             <a:rPr lang="zh-CN" altLang="zh-CN" sz="1600" i="1">
-                              <a:latin typeface="Cambria Math" charset="0"/>
+                              <a:latin typeface="Cambria Math" panose="02040503050406030204" pitchFamily="18" charset="0"/>
                             </a:rPr>
                           </m:ctrlPr>
                         </m:dPr>
@@ -5135,7 +6086,7 @@
                             <m:eqArrPr>
                               <m:ctrlPr>
                                 <a:rPr lang="zh-CN" altLang="zh-CN" sz="1600" i="1">
-                                  <a:latin typeface="Cambria Math" charset="0"/>
+                                  <a:latin typeface="Cambria Math" panose="02040503050406030204" pitchFamily="18" charset="0"/>
                                 </a:rPr>
                               </m:ctrlPr>
                             </m:eqArrPr>
@@ -5150,7 +6101,7 @@
                                 <m:sSubPr>
                                   <m:ctrlPr>
                                     <a:rPr lang="zh-CN" altLang="zh-CN" sz="1600" i="1">
-                                      <a:latin typeface="Cambria Math" charset="0"/>
+                                      <a:latin typeface="Cambria Math" panose="02040503050406030204" pitchFamily="18" charset="0"/>
                                     </a:rPr>
                                   </m:ctrlPr>
                                 </m:sSubPr>
@@ -5176,7 +6127,7 @@
                                   <m:chr m:val="̈"/>
                                   <m:ctrlPr>
                                     <a:rPr lang="zh-CN" altLang="zh-CN" sz="1600" i="1">
-                                      <a:latin typeface="Cambria Math" charset="0"/>
+                                      <a:latin typeface="Cambria Math" panose="02040503050406030204" pitchFamily="18" charset="0"/>
                                     </a:rPr>
                                   </m:ctrlPr>
                                 </m:accPr>
@@ -5199,7 +6150,7 @@
                                 <m:sSubPr>
                                   <m:ctrlPr>
                                     <a:rPr lang="zh-CN" altLang="zh-CN" sz="1600" i="1">
-                                      <a:latin typeface="Cambria Math" charset="0"/>
+                                      <a:latin typeface="Cambria Math" panose="02040503050406030204" pitchFamily="18" charset="0"/>
                                     </a:rPr>
                                   </m:ctrlPr>
                                 </m:sSubPr>
@@ -5232,7 +6183,7 @@
                                 <m:sSubPr>
                                   <m:ctrlPr>
                                     <a:rPr lang="zh-CN" altLang="zh-CN" sz="1600" i="1">
-                                      <a:latin typeface="Cambria Math" charset="0"/>
+                                      <a:latin typeface="Cambria Math" panose="02040503050406030204" pitchFamily="18" charset="0"/>
                                     </a:rPr>
                                   </m:ctrlPr>
                                 </m:sSubPr>
@@ -5258,7 +6209,7 @@
                                   <m:chr m:val="̈"/>
                                   <m:ctrlPr>
                                     <a:rPr lang="zh-CN" altLang="zh-CN" sz="1600" i="1">
-                                      <a:latin typeface="Cambria Math" charset="0"/>
+                                      <a:latin typeface="Cambria Math" panose="02040503050406030204" pitchFamily="18" charset="0"/>
                                     </a:rPr>
                                   </m:ctrlPr>
                                 </m:accPr>
@@ -5281,7 +6232,7 @@
                                 <m:sSubPr>
                                   <m:ctrlPr>
                                     <a:rPr lang="zh-CN" altLang="zh-CN" sz="1600" i="1">
-                                      <a:latin typeface="Cambria Math" charset="0"/>
+                                      <a:latin typeface="Cambria Math" panose="02040503050406030204" pitchFamily="18" charset="0"/>
                                     </a:rPr>
                                   </m:ctrlPr>
                                 </m:sSubPr>
@@ -5312,7 +6263,7 @@
                                 <m:sSubPr>
                                   <m:ctrlPr>
                                     <a:rPr lang="zh-CN" altLang="zh-CN" sz="1600" i="1">
-                                      <a:latin typeface="Cambria Math" charset="0"/>
+                                      <a:latin typeface="Cambria Math" panose="02040503050406030204" pitchFamily="18" charset="0"/>
                                     </a:rPr>
                                   </m:ctrlPr>
                                 </m:sSubPr>
@@ -5374,7 +6325,7 @@
                         <m:sSubPr>
                           <m:ctrlPr>
                             <a:rPr lang="zh-CN" altLang="zh-CN" sz="1600" i="1">
-                              <a:latin typeface="Cambria Math" charset="0"/>
+                              <a:latin typeface="Cambria Math" panose="02040503050406030204" pitchFamily="18" charset="0"/>
                             </a:rPr>
                           </m:ctrlPr>
                         </m:sSubPr>
@@ -5400,7 +6351,7 @@
                           <m:chr m:val="̈"/>
                           <m:ctrlPr>
                             <a:rPr lang="zh-CN" altLang="zh-CN" sz="1600" i="1">
-                              <a:latin typeface="Cambria Math" charset="0"/>
+                              <a:latin typeface="Cambria Math" panose="02040503050406030204" pitchFamily="18" charset="0"/>
                             </a:rPr>
                           </m:ctrlPr>
                         </m:accPr>
@@ -5423,7 +6374,7 @@
                         <m:sSubPr>
                           <m:ctrlPr>
                             <a:rPr lang="zh-CN" altLang="zh-CN" sz="1600" i="1">
-                              <a:latin typeface="Cambria Math" charset="0"/>
+                              <a:latin typeface="Cambria Math" panose="02040503050406030204" pitchFamily="18" charset="0"/>
                             </a:rPr>
                           </m:ctrlPr>
                         </m:sSubPr>
@@ -5466,7 +6417,7 @@
                         <m:sSubPr>
                           <m:ctrlPr>
                             <a:rPr lang="zh-CN" altLang="zh-CN" sz="1600" i="1">
-                              <a:latin typeface="Cambria Math" charset="0"/>
+                              <a:latin typeface="Cambria Math" panose="02040503050406030204" pitchFamily="18" charset="0"/>
                             </a:rPr>
                           </m:ctrlPr>
                         </m:sSubPr>
@@ -5532,7 +6483,7 @@
                           <m:endChr m:val=""/>
                           <m:ctrlPr>
                             <a:rPr lang="zh-CN" altLang="zh-CN" sz="1600" i="1">
-                              <a:latin typeface="Cambria Math" charset="0"/>
+                              <a:latin typeface="Cambria Math" panose="02040503050406030204" pitchFamily="18" charset="0"/>
                             </a:rPr>
                           </m:ctrlPr>
                         </m:dPr>
@@ -5541,7 +6492,7 @@
                             <m:eqArrPr>
                               <m:ctrlPr>
                                 <a:rPr lang="zh-CN" altLang="zh-CN" sz="1600" i="1">
-                                  <a:latin typeface="Cambria Math" charset="0"/>
+                                  <a:latin typeface="Cambria Math" panose="02040503050406030204" pitchFamily="18" charset="0"/>
                                 </a:rPr>
                               </m:ctrlPr>
                             </m:eqArrPr>
@@ -5966,7 +6917,7 @@
                       <m:sSubPr>
                         <m:ctrlPr>
                           <a:rPr kumimoji="1" lang="en-US" altLang="zh-CN" b="0" i="1" smtClean="0">
-                            <a:latin typeface="Cambria Math" charset="0"/>
+                            <a:latin typeface="Cambria Math" panose="02040503050406030204" pitchFamily="18" charset="0"/>
                           </a:rPr>
                         </m:ctrlPr>
                       </m:sSubPr>
@@ -6021,13 +6972,13 @@
                       <a:rPr kumimoji="1" lang="zh-CN" altLang="en-US" b="0" i="1" smtClean="0">
                         <a:latin typeface="Cambria Math" charset="0"/>
                       </a:rPr>
-                      <m:t> 都可被</m:t>
+                      <m:t> </m:t>
                     </m:r>
                     <m:r>
-                      <a:rPr kumimoji="1" lang="zh-CN" altLang="en-US" i="1" smtClean="0">
+                      <a:rPr kumimoji="1" lang="zh-CN" altLang="en-US" b="0" i="1" smtClean="0">
                         <a:latin typeface="Cambria Math" charset="0"/>
                       </a:rPr>
-                      <m:t>计算</m:t>
+                      <m:t>都可被计算</m:t>
                     </m:r>
                   </m:oMath>
                 </a14:m>
@@ -6064,7 +7015,7 @@
                           <m:endChr m:val=""/>
                           <m:ctrlPr>
                             <a:rPr lang="zh-CN" altLang="zh-CN" sz="1600" i="1">
-                              <a:latin typeface="Cambria Math" charset="0"/>
+                              <a:latin typeface="Cambria Math" panose="02040503050406030204" pitchFamily="18" charset="0"/>
                             </a:rPr>
                           </m:ctrlPr>
                         </m:dPr>
@@ -6073,7 +7024,7 @@
                             <m:eqArrPr>
                               <m:ctrlPr>
                                 <a:rPr lang="zh-CN" altLang="zh-CN" sz="1600" i="1">
-                                  <a:latin typeface="Cambria Math" charset="0"/>
+                                  <a:latin typeface="Cambria Math" panose="02040503050406030204" pitchFamily="18" charset="0"/>
                                 </a:rPr>
                               </m:ctrlPr>
                             </m:eqArrPr>
@@ -6088,7 +7039,7 @@
                                 <m:dPr>
                                   <m:ctrlPr>
                                     <a:rPr lang="zh-CN" altLang="zh-CN" sz="1600" i="1">
-                                      <a:latin typeface="Cambria Math" charset="0"/>
+                                      <a:latin typeface="Cambria Math" panose="02040503050406030204" pitchFamily="18" charset="0"/>
                                     </a:rPr>
                                   </m:ctrlPr>
                                 </m:dPr>
@@ -6097,7 +7048,7 @@
                                     <m:sSubPr>
                                       <m:ctrlPr>
                                         <a:rPr lang="zh-CN" altLang="zh-CN" sz="1600" i="1">
-                                          <a:latin typeface="Cambria Math" charset="0"/>
+                                          <a:latin typeface="Cambria Math" panose="02040503050406030204" pitchFamily="18" charset="0"/>
                                         </a:rPr>
                                       </m:ctrlPr>
                                     </m:sSubPr>
@@ -6128,7 +7079,7 @@
                                     <m:sSubPr>
                                       <m:ctrlPr>
                                         <a:rPr lang="zh-CN" altLang="zh-CN" sz="1600" i="1">
-                                          <a:latin typeface="Cambria Math" charset="0"/>
+                                          <a:latin typeface="Cambria Math" panose="02040503050406030204" pitchFamily="18" charset="0"/>
                                         </a:rPr>
                                       </m:ctrlPr>
                                     </m:sSubPr>
@@ -6153,7 +7104,7 @@
                                     <m:sSupPr>
                                       <m:ctrlPr>
                                         <a:rPr lang="zh-CN" altLang="zh-CN" sz="1600" i="1">
-                                          <a:latin typeface="Cambria Math" charset="0"/>
+                                          <a:latin typeface="Cambria Math" panose="02040503050406030204" pitchFamily="18" charset="0"/>
                                         </a:rPr>
                                       </m:ctrlPr>
                                     </m:sSupPr>
@@ -6184,7 +7135,7 @@
                                     <m:sSubPr>
                                       <m:ctrlPr>
                                         <a:rPr lang="zh-CN" altLang="zh-CN" sz="1600" i="1">
-                                          <a:latin typeface="Cambria Math" charset="0"/>
+                                          <a:latin typeface="Cambria Math" panose="02040503050406030204" pitchFamily="18" charset="0"/>
                                         </a:rPr>
                                       </m:ctrlPr>
                                     </m:sSubPr>
@@ -6209,7 +7160,7 @@
                                     <m:sSupPr>
                                       <m:ctrlPr>
                                         <a:rPr lang="zh-CN" altLang="zh-CN" sz="1600" i="1">
-                                          <a:latin typeface="Cambria Math" charset="0"/>
+                                          <a:latin typeface="Cambria Math" panose="02040503050406030204" pitchFamily="18" charset="0"/>
                                         </a:rPr>
                                       </m:ctrlPr>
                                     </m:sSupPr>
@@ -6237,7 +7188,7 @@
                                   <m:chr m:val="̈"/>
                                   <m:ctrlPr>
                                     <a:rPr lang="zh-CN" altLang="zh-CN" sz="1600" i="1">
-                                      <a:latin typeface="Cambria Math" charset="0"/>
+                                      <a:latin typeface="Cambria Math" panose="02040503050406030204" pitchFamily="18" charset="0"/>
                                     </a:rPr>
                                   </m:ctrlPr>
                                 </m:accPr>
@@ -6260,7 +7211,7 @@
                                 <m:sSubPr>
                                   <m:ctrlPr>
                                     <a:rPr lang="zh-CN" altLang="zh-CN" sz="1600" i="1">
-                                      <a:latin typeface="Cambria Math" charset="0"/>
+                                      <a:latin typeface="Cambria Math" panose="02040503050406030204" pitchFamily="18" charset="0"/>
                                     </a:rPr>
                                   </m:ctrlPr>
                                 </m:sSubPr>
@@ -6292,7 +7243,7 @@
                                   <m:chr m:val="̈"/>
                                   <m:ctrlPr>
                                     <a:rPr lang="zh-CN" altLang="zh-CN" sz="1600" i="1">
-                                      <a:latin typeface="Cambria Math" charset="0"/>
+                                      <a:latin typeface="Cambria Math" panose="02040503050406030204" pitchFamily="18" charset="0"/>
                                     </a:rPr>
                                   </m:ctrlPr>
                                 </m:accPr>
@@ -6322,7 +7273,7 @@
                                   <m:chr m:val="̇"/>
                                   <m:ctrlPr>
                                     <a:rPr lang="zh-CN" altLang="zh-CN" sz="1600" i="1">
-                                      <a:latin typeface="Cambria Math" charset="0"/>
+                                      <a:latin typeface="Cambria Math" panose="02040503050406030204" pitchFamily="18" charset="0"/>
                                     </a:rPr>
                                   </m:ctrlPr>
                                 </m:accPr>
@@ -6359,7 +7310,7 @@
                                 <m:sSubPr>
                                   <m:ctrlPr>
                                     <a:rPr lang="zh-CN" altLang="zh-CN" sz="1600" i="1">
-                                      <a:latin typeface="Cambria Math" charset="0"/>
+                                      <a:latin typeface="Cambria Math" panose="02040503050406030204" pitchFamily="18" charset="0"/>
                                     </a:rPr>
                                   </m:ctrlPr>
                                 </m:sSubPr>
@@ -6396,7 +7347,7 @@
                                 <m:sSubPr>
                                   <m:ctrlPr>
                                     <a:rPr lang="zh-CN" altLang="zh-CN" sz="1600" i="1">
-                                      <a:latin typeface="Cambria Math" charset="0"/>
+                                      <a:latin typeface="Cambria Math" panose="02040503050406030204" pitchFamily="18" charset="0"/>
                                     </a:rPr>
                                   </m:ctrlPr>
                                 </m:sSubPr>
@@ -6421,7 +7372,7 @@
                                 <m:sSupPr>
                                   <m:ctrlPr>
                                     <a:rPr lang="zh-CN" altLang="zh-CN" sz="1600" i="1">
-                                      <a:latin typeface="Cambria Math" charset="0"/>
+                                      <a:latin typeface="Cambria Math" panose="02040503050406030204" pitchFamily="18" charset="0"/>
                                     </a:rPr>
                                   </m:ctrlPr>
                                 </m:sSupPr>
@@ -6453,7 +7404,7 @@
                                   <m:chr m:val="̈"/>
                                   <m:ctrlPr>
                                     <a:rPr lang="zh-CN" altLang="zh-CN" sz="1600" i="1">
-                                      <a:latin typeface="Cambria Math" charset="0"/>
+                                      <a:latin typeface="Cambria Math" panose="02040503050406030204" pitchFamily="18" charset="0"/>
                                     </a:rPr>
                                   </m:ctrlPr>
                                 </m:accPr>
@@ -6476,7 +7427,7 @@
                                 <m:sSubPr>
                                   <m:ctrlPr>
                                     <a:rPr lang="zh-CN" altLang="zh-CN" sz="1600" i="1">
-                                      <a:latin typeface="Cambria Math" charset="0"/>
+                                      <a:latin typeface="Cambria Math" panose="02040503050406030204" pitchFamily="18" charset="0"/>
                                     </a:rPr>
                                   </m:ctrlPr>
                                 </m:sSubPr>
@@ -6508,7 +7459,7 @@
                                   <m:chr m:val="̈"/>
                                   <m:ctrlPr>
                                     <a:rPr lang="zh-CN" altLang="zh-CN" sz="1600" i="1">
-                                      <a:latin typeface="Cambria Math" charset="0"/>
+                                      <a:latin typeface="Cambria Math" panose="02040503050406030204" pitchFamily="18" charset="0"/>
                                     </a:rPr>
                                   </m:ctrlPr>
                                 </m:accPr>
@@ -6531,7 +7482,7 @@
                                 <m:sSubPr>
                                   <m:ctrlPr>
                                     <a:rPr lang="zh-CN" altLang="zh-CN" sz="1600" i="1">
-                                      <a:latin typeface="Cambria Math" charset="0"/>
+                                      <a:latin typeface="Cambria Math" panose="02040503050406030204" pitchFamily="18" charset="0"/>
                                     </a:rPr>
                                   </m:ctrlPr>
                                 </m:sSubPr>
@@ -6882,7 +7833,7 @@
                       <m:sSubPr>
                         <m:ctrlPr>
                           <a:rPr kumimoji="1" lang="en-US" altLang="zh-CN" b="0" i="1" smtClean="0">
-                            <a:latin typeface="Cambria Math" charset="0"/>
+                            <a:latin typeface="Cambria Math" panose="02040503050406030204" pitchFamily="18" charset="0"/>
                           </a:rPr>
                         </m:ctrlPr>
                       </m:sSubPr>
@@ -6919,7 +7870,7 @@
                       <m:sSubPr>
                         <m:ctrlPr>
                           <a:rPr kumimoji="1" lang="en-US" altLang="zh-CN" b="0" i="1" smtClean="0">
-                            <a:latin typeface="Cambria Math" charset="0"/>
+                            <a:latin typeface="Cambria Math" panose="02040503050406030204" pitchFamily="18" charset="0"/>
                           </a:rPr>
                         </m:ctrlPr>
                       </m:sSubPr>
@@ -6975,7 +7926,7 @@
                         <m:sSupPr>
                           <m:ctrlPr>
                             <a:rPr lang="zh-CN" altLang="zh-CN" sz="1600" i="1">
-                              <a:latin typeface="Cambria Math" charset="0"/>
+                              <a:latin typeface="Cambria Math" panose="02040503050406030204" pitchFamily="18" charset="0"/>
                             </a:rPr>
                           </m:ctrlPr>
                         </m:sSupPr>
@@ -6984,7 +7935,7 @@
                             <m:dPr>
                               <m:ctrlPr>
                                 <a:rPr lang="zh-CN" altLang="zh-CN" sz="1600" i="1">
-                                  <a:latin typeface="Cambria Math" charset="0"/>
+                                  <a:latin typeface="Cambria Math" panose="02040503050406030204" pitchFamily="18" charset="0"/>
                                 </a:rPr>
                               </m:ctrlPr>
                             </m:dPr>
@@ -7001,7 +7952,7 @@
                                   </m:mcs>
                                   <m:ctrlPr>
                                     <a:rPr lang="zh-CN" altLang="zh-CN" sz="1600" i="1">
-                                      <a:latin typeface="Cambria Math" charset="0"/>
+                                      <a:latin typeface="Cambria Math" panose="02040503050406030204" pitchFamily="18" charset="0"/>
                                     </a:rPr>
                                   </m:ctrlPr>
                                 </m:mPr>
@@ -7080,7 +8031,7 @@
                         <m:sSupPr>
                           <m:ctrlPr>
                             <a:rPr lang="zh-CN" altLang="zh-CN" sz="1600" i="1">
-                              <a:latin typeface="Cambria Math" charset="0"/>
+                              <a:latin typeface="Cambria Math" panose="02040503050406030204" pitchFamily="18" charset="0"/>
                             </a:rPr>
                           </m:ctrlPr>
                         </m:sSupPr>
@@ -7089,7 +8040,7 @@
                             <m:dPr>
                               <m:ctrlPr>
                                 <a:rPr lang="zh-CN" altLang="zh-CN" sz="1600" i="1">
-                                  <a:latin typeface="Cambria Math" charset="0"/>
+                                  <a:latin typeface="Cambria Math" panose="02040503050406030204" pitchFamily="18" charset="0"/>
                                 </a:rPr>
                               </m:ctrlPr>
                             </m:dPr>
@@ -7106,7 +8057,7 @@
                                   </m:mcs>
                                   <m:ctrlPr>
                                     <a:rPr lang="zh-CN" altLang="zh-CN" sz="1600" i="1">
-                                      <a:latin typeface="Cambria Math" charset="0"/>
+                                      <a:latin typeface="Cambria Math" panose="02040503050406030204" pitchFamily="18" charset="0"/>
                                     </a:rPr>
                                   </m:ctrlPr>
                                 </m:mPr>
@@ -7170,7 +8121,7 @@
                                       <m:dPr>
                                         <m:ctrlPr>
                                           <a:rPr lang="zh-CN" altLang="zh-CN" sz="1600" i="1">
-                                            <a:latin typeface="Cambria Math" charset="0"/>
+                                            <a:latin typeface="Cambria Math" panose="02040503050406030204" pitchFamily="18" charset="0"/>
                                           </a:rPr>
                                         </m:ctrlPr>
                                       </m:dPr>
@@ -7195,7 +8146,7 @@
                                       <m:dPr>
                                         <m:ctrlPr>
                                           <a:rPr lang="zh-CN" altLang="zh-CN" sz="1600" i="1">
-                                            <a:latin typeface="Cambria Math" charset="0"/>
+                                            <a:latin typeface="Cambria Math" panose="02040503050406030204" pitchFamily="18" charset="0"/>
                                           </a:rPr>
                                         </m:ctrlPr>
                                       </m:dPr>
@@ -7251,7 +8202,7 @@
                         <m:sSupPr>
                           <m:ctrlPr>
                             <a:rPr lang="zh-CN" altLang="zh-CN" sz="1600" i="1">
-                              <a:latin typeface="Cambria Math" charset="0"/>
+                              <a:latin typeface="Cambria Math" panose="02040503050406030204" pitchFamily="18" charset="0"/>
                             </a:rPr>
                           </m:ctrlPr>
                         </m:sSupPr>
@@ -7282,7 +8233,7 @@
                         <m:sSupPr>
                           <m:ctrlPr>
                             <a:rPr lang="zh-CN" altLang="zh-CN" sz="1600" i="1">
-                              <a:latin typeface="Cambria Math" charset="0"/>
+                              <a:latin typeface="Cambria Math" panose="02040503050406030204" pitchFamily="18" charset="0"/>
                             </a:rPr>
                           </m:ctrlPr>
                         </m:sSupPr>
@@ -7291,7 +8242,7 @@
                             <m:dPr>
                               <m:ctrlPr>
                                 <a:rPr lang="zh-CN" altLang="zh-CN" sz="1600" i="1">
-                                  <a:latin typeface="Cambria Math" charset="0"/>
+                                  <a:latin typeface="Cambria Math" panose="02040503050406030204" pitchFamily="18" charset="0"/>
                                 </a:rPr>
                               </m:ctrlPr>
                             </m:dPr>
@@ -7308,7 +8259,7 @@
                                   </m:mcs>
                                   <m:ctrlPr>
                                     <a:rPr lang="zh-CN" altLang="zh-CN" sz="1600" i="1">
-                                      <a:latin typeface="Cambria Math" charset="0"/>
+                                      <a:latin typeface="Cambria Math" panose="02040503050406030204" pitchFamily="18" charset="0"/>
                                     </a:rPr>
                                   </m:ctrlPr>
                                 </m:mPr>
@@ -7332,7 +8283,7 @@
                                       <m:sSubPr>
                                         <m:ctrlPr>
                                           <a:rPr lang="zh-CN" altLang="zh-CN" sz="1600" i="1">
-                                            <a:latin typeface="Cambria Math" charset="0"/>
+                                            <a:latin typeface="Cambria Math" panose="02040503050406030204" pitchFamily="18" charset="0"/>
                                           </a:rPr>
                                         </m:ctrlPr>
                                       </m:sSubPr>
@@ -7384,7 +8335,7 @@
                                         <m:chr m:val="̇"/>
                                         <m:ctrlPr>
                                           <a:rPr lang="zh-CN" altLang="zh-CN" sz="1600" i="1">
-                                            <a:latin typeface="Cambria Math" charset="0"/>
+                                            <a:latin typeface="Cambria Math" panose="02040503050406030204" pitchFamily="18" charset="0"/>
                                           </a:rPr>
                                         </m:ctrlPr>
                                       </m:accPr>
@@ -7417,7 +8368,7 @@
                                       <m:sSubPr>
                                         <m:ctrlPr>
                                           <a:rPr lang="zh-CN" altLang="zh-CN" sz="1600" i="1">
-                                            <a:latin typeface="Cambria Math" charset="0"/>
+                                            <a:latin typeface="Cambria Math" panose="02040503050406030204" pitchFamily="18" charset="0"/>
                                           </a:rPr>
                                         </m:ctrlPr>
                                       </m:sSubPr>
@@ -7519,7 +8470,7 @@
                           </m:mcs>
                           <m:ctrlPr>
                             <a:rPr lang="zh-CN" altLang="zh-CN" sz="1600" i="1">
-                              <a:latin typeface="Cambria Math" charset="0"/>
+                              <a:latin typeface="Cambria Math" panose="02040503050406030204" pitchFamily="18" charset="0"/>
                             </a:rPr>
                           </m:ctrlPr>
                         </m:mPr>
@@ -7529,7 +8480,7 @@
                               <m:sSubPr>
                                 <m:ctrlPr>
                                   <a:rPr lang="zh-CN" altLang="zh-CN" sz="1600" i="1">
-                                    <a:latin typeface="Cambria Math" charset="0"/>
+                                    <a:latin typeface="Cambria Math" panose="02040503050406030204" pitchFamily="18" charset="0"/>
                                   </a:rPr>
                                 </m:ctrlPr>
                               </m:sSubPr>
@@ -7556,7 +8507,7 @@
                               <m:sSubPr>
                                 <m:ctrlPr>
                                   <a:rPr lang="zh-CN" altLang="zh-CN" sz="1600" i="1">
-                                    <a:latin typeface="Cambria Math" charset="0"/>
+                                    <a:latin typeface="Cambria Math" panose="02040503050406030204" pitchFamily="18" charset="0"/>
                                   </a:rPr>
                                 </m:ctrlPr>
                               </m:sSubPr>
@@ -7583,7 +8534,7 @@
                               <m:sSubPr>
                                 <m:ctrlPr>
                                   <a:rPr lang="zh-CN" altLang="zh-CN" sz="1600" i="1">
-                                    <a:latin typeface="Cambria Math" charset="0"/>
+                                    <a:latin typeface="Cambria Math" panose="02040503050406030204" pitchFamily="18" charset="0"/>
                                   </a:rPr>
                                 </m:ctrlPr>
                               </m:sSubPr>
@@ -7610,7 +8561,7 @@
                               <m:sSubPr>
                                 <m:ctrlPr>
                                   <a:rPr lang="zh-CN" altLang="zh-CN" sz="1600" i="1">
-                                    <a:latin typeface="Cambria Math" charset="0"/>
+                                    <a:latin typeface="Cambria Math" panose="02040503050406030204" pitchFamily="18" charset="0"/>
                                   </a:rPr>
                                 </m:ctrlPr>
                               </m:sSubPr>
@@ -7637,7 +8588,7 @@
                               <m:sSubPr>
                                 <m:ctrlPr>
                                   <a:rPr lang="zh-CN" altLang="zh-CN" sz="1600" i="1">
-                                    <a:latin typeface="Cambria Math" charset="0"/>
+                                    <a:latin typeface="Cambria Math" panose="02040503050406030204" pitchFamily="18" charset="0"/>
                                   </a:rPr>
                                 </m:ctrlPr>
                               </m:sSubPr>
@@ -7664,7 +8615,7 @@
                               <m:sSubPr>
                                 <m:ctrlPr>
                                   <a:rPr lang="zh-CN" altLang="zh-CN" sz="1600" i="1">
-                                    <a:latin typeface="Cambria Math" charset="0"/>
+                                    <a:latin typeface="Cambria Math" panose="02040503050406030204" pitchFamily="18" charset="0"/>
                                   </a:rPr>
                                 </m:ctrlPr>
                               </m:sSubPr>
@@ -7972,7 +8923,7 @@
                         <m:sSupPr>
                           <m:ctrlPr>
                             <a:rPr lang="en-US" altLang="zh-CN" b="0" i="1" smtClean="0">
-                              <a:latin typeface="Cambria Math" charset="0"/>
+                              <a:latin typeface="Cambria Math" panose="02040503050406030204" pitchFamily="18" charset="0"/>
                             </a:rPr>
                           </m:ctrlPr>
                         </m:sSupPr>
@@ -7982,7 +8933,7 @@
                               <m:begChr m:val=""/>
                               <m:ctrlPr>
                                 <a:rPr lang="zh-CN" altLang="en-US" i="1" smtClean="0">
-                                  <a:latin typeface="Cambria Math" charset="0"/>
+                                  <a:latin typeface="Cambria Math" panose="02040503050406030204" pitchFamily="18" charset="0"/>
                                 </a:rPr>
                               </m:ctrlPr>
                             </m:dPr>
@@ -8012,7 +8963,7 @@
                                   </m:mcs>
                                   <m:ctrlPr>
                                     <a:rPr lang="zh-CN" altLang="en-US" i="1">
-                                      <a:latin typeface="Cambria Math" charset="0"/>
+                                      <a:latin typeface="Cambria Math" panose="02040503050406030204" pitchFamily="18" charset="0"/>
                                     </a:rPr>
                                   </m:ctrlPr>
                                 </m:mPr>
@@ -8039,7 +8990,7 @@
                                         <m:chr m:val="̇"/>
                                         <m:ctrlPr>
                                           <a:rPr lang="zh-CN" altLang="en-US" i="1">
-                                            <a:latin typeface="Cambria Math" charset="0"/>
+                                            <a:latin typeface="Cambria Math" panose="02040503050406030204" pitchFamily="18" charset="0"/>
                                           </a:rPr>
                                         </m:ctrlPr>
                                       </m:accPr>
@@ -8059,7 +9010,7 @@
                                         <m:chr m:val="̇"/>
                                         <m:ctrlPr>
                                           <a:rPr lang="zh-CN" altLang="en-US" i="1">
-                                            <a:latin typeface="Cambria Math" charset="0"/>
+                                            <a:latin typeface="Cambria Math" panose="02040503050406030204" pitchFamily="18" charset="0"/>
                                           </a:rPr>
                                         </m:ctrlPr>
                                       </m:accPr>
@@ -8180,7 +9131,7 @@
                         <m:dPr>
                           <m:ctrlPr>
                             <a:rPr lang="zh-CN" altLang="en-US" i="1">
-                              <a:latin typeface="Cambria Math" charset="0"/>
+                              <a:latin typeface="Cambria Math" panose="02040503050406030204" pitchFamily="18" charset="0"/>
                             </a:rPr>
                           </m:ctrlPr>
                         </m:dPr>
@@ -8198,7 +9149,7 @@
                               </m:mcs>
                               <m:ctrlPr>
                                 <a:rPr lang="zh-CN" altLang="en-US" i="1">
-                                  <a:latin typeface="Cambria Math" charset="0"/>
+                                  <a:latin typeface="Cambria Math" panose="02040503050406030204" pitchFamily="18" charset="0"/>
                                 </a:rPr>
                               </m:ctrlPr>
                             </m:mPr>
@@ -8284,7 +9235,7 @@
                                   <m:fPr>
                                     <m:ctrlPr>
                                       <a:rPr lang="zh-CN" altLang="en-US" i="1">
-                                        <a:latin typeface="Cambria Math" charset="0"/>
+                                        <a:latin typeface="Cambria Math" panose="02040503050406030204" pitchFamily="18" charset="0"/>
                                       </a:rPr>
                                     </m:ctrlPr>
                                   </m:fPr>
@@ -8305,7 +9256,7 @@
                                       <m:sSupPr>
                                         <m:ctrlPr>
                                           <a:rPr lang="zh-CN" altLang="en-US" i="1">
-                                            <a:latin typeface="Cambria Math" charset="0"/>
+                                            <a:latin typeface="Cambria Math" panose="02040503050406030204" pitchFamily="18" charset="0"/>
                                           </a:rPr>
                                         </m:ctrlPr>
                                       </m:sSupPr>
@@ -8330,7 +9281,7 @@
                                       <m:sSubSupPr>
                                         <m:ctrlPr>
                                           <a:rPr lang="zh-CN" altLang="en-US" i="1">
-                                            <a:latin typeface="Cambria Math" charset="0"/>
+                                            <a:latin typeface="Cambria Math" panose="02040503050406030204" pitchFamily="18" charset="0"/>
                                           </a:rPr>
                                         </m:ctrlPr>
                                       </m:sSubSupPr>
@@ -8375,7 +9326,7 @@
                                   <m:fPr>
                                     <m:ctrlPr>
                                       <a:rPr lang="zh-CN" altLang="en-US" i="1">
-                                        <a:latin typeface="Cambria Math" charset="0"/>
+                                        <a:latin typeface="Cambria Math" panose="02040503050406030204" pitchFamily="18" charset="0"/>
                                       </a:rPr>
                                     </m:ctrlPr>
                                   </m:fPr>
@@ -8390,7 +9341,7 @@
                                       <m:sSubPr>
                                         <m:ctrlPr>
                                           <a:rPr lang="zh-CN" altLang="en-US" i="1">
-                                            <a:latin typeface="Cambria Math" charset="0"/>
+                                            <a:latin typeface="Cambria Math" panose="02040503050406030204" pitchFamily="18" charset="0"/>
                                           </a:rPr>
                                         </m:ctrlPr>
                                       </m:sSubPr>
@@ -8421,7 +9372,7 @@
                                       <m:sSupPr>
                                         <m:ctrlPr>
                                           <a:rPr lang="zh-CN" altLang="en-US" i="1">
-                                            <a:latin typeface="Cambria Math" charset="0"/>
+                                            <a:latin typeface="Cambria Math" panose="02040503050406030204" pitchFamily="18" charset="0"/>
                                           </a:rPr>
                                         </m:ctrlPr>
                                       </m:sSupPr>
@@ -8458,7 +9409,7 @@
                                       <m:sSubPr>
                                         <m:ctrlPr>
                                           <a:rPr lang="zh-CN" altLang="en-US" i="1">
-                                            <a:latin typeface="Cambria Math" charset="0"/>
+                                            <a:latin typeface="Cambria Math" panose="02040503050406030204" pitchFamily="18" charset="0"/>
                                           </a:rPr>
                                         </m:ctrlPr>
                                       </m:sSubPr>
@@ -8513,7 +9464,7 @@
                                   <m:fPr>
                                     <m:ctrlPr>
                                       <a:rPr lang="zh-CN" altLang="en-US" i="1">
-                                        <a:latin typeface="Cambria Math" charset="0"/>
+                                        <a:latin typeface="Cambria Math" panose="02040503050406030204" pitchFamily="18" charset="0"/>
                                       </a:rPr>
                                     </m:ctrlPr>
                                   </m:fPr>
@@ -8528,7 +9479,7 @@
                                       <m:sSubPr>
                                         <m:ctrlPr>
                                           <a:rPr lang="zh-CN" altLang="en-US" i="1">
-                                            <a:latin typeface="Cambria Math" charset="0"/>
+                                            <a:latin typeface="Cambria Math" panose="02040503050406030204" pitchFamily="18" charset="0"/>
                                           </a:rPr>
                                         </m:ctrlPr>
                                       </m:sSubPr>
@@ -8553,7 +9504,7 @@
                                       <m:dPr>
                                         <m:ctrlPr>
                                           <a:rPr lang="zh-CN" altLang="en-US" i="1">
-                                            <a:latin typeface="Cambria Math" charset="0"/>
+                                            <a:latin typeface="Cambria Math" panose="02040503050406030204" pitchFamily="18" charset="0"/>
                                           </a:rPr>
                                         </m:ctrlPr>
                                       </m:dPr>
@@ -8562,7 +9513,7 @@
                                           <m:sSubPr>
                                             <m:ctrlPr>
                                               <a:rPr lang="zh-CN" altLang="en-US" i="1">
-                                                <a:latin typeface="Cambria Math" charset="0"/>
+                                                <a:latin typeface="Cambria Math" panose="02040503050406030204" pitchFamily="18" charset="0"/>
                                               </a:rPr>
                                             </m:ctrlPr>
                                           </m:sSubPr>
@@ -8599,7 +9550,7 @@
                                           <m:sSupPr>
                                             <m:ctrlPr>
                                               <a:rPr lang="zh-CN" altLang="en-US" i="1">
-                                                <a:latin typeface="Cambria Math" charset="0"/>
+                                                <a:latin typeface="Cambria Math" panose="02040503050406030204" pitchFamily="18" charset="0"/>
                                               </a:rPr>
                                             </m:ctrlPr>
                                           </m:sSupPr>
@@ -8630,7 +9581,7 @@
                                           <m:sSubPr>
                                             <m:ctrlPr>
                                               <a:rPr lang="zh-CN" altLang="en-US" i="1">
-                                                <a:latin typeface="Cambria Math" charset="0"/>
+                                                <a:latin typeface="Cambria Math" panose="02040503050406030204" pitchFamily="18" charset="0"/>
                                               </a:rPr>
                                             </m:ctrlPr>
                                           </m:sSubPr>
@@ -8661,7 +9612,7 @@
                                           <m:sSupPr>
                                             <m:ctrlPr>
                                               <a:rPr lang="zh-CN" altLang="en-US" i="1">
-                                                <a:latin typeface="Cambria Math" charset="0"/>
+                                                <a:latin typeface="Cambria Math" panose="02040503050406030204" pitchFamily="18" charset="0"/>
                                               </a:rPr>
                                             </m:ctrlPr>
                                           </m:sSupPr>
@@ -8692,7 +9643,7 @@
                                           <m:sSubPr>
                                             <m:ctrlPr>
                                               <a:rPr lang="zh-CN" altLang="en-US" i="1">
-                                                <a:latin typeface="Cambria Math" charset="0"/>
+                                                <a:latin typeface="Cambria Math" panose="02040503050406030204" pitchFamily="18" charset="0"/>
                                               </a:rPr>
                                             </m:ctrlPr>
                                           </m:sSubPr>
@@ -8731,7 +9682,7 @@
                                   <m:fPr>
                                     <m:ctrlPr>
                                       <a:rPr lang="zh-CN" altLang="en-US" i="1">
-                                        <a:latin typeface="Cambria Math" charset="0"/>
+                                        <a:latin typeface="Cambria Math" panose="02040503050406030204" pitchFamily="18" charset="0"/>
                                       </a:rPr>
                                     </m:ctrlPr>
                                   </m:fPr>
@@ -8752,7 +9703,7 @@
                                       <m:sSubPr>
                                         <m:ctrlPr>
                                           <a:rPr lang="zh-CN" altLang="en-US" i="1">
-                                            <a:latin typeface="Cambria Math" charset="0"/>
+                                            <a:latin typeface="Cambria Math" panose="02040503050406030204" pitchFamily="18" charset="0"/>
                                           </a:rPr>
                                         </m:ctrlPr>
                                       </m:sSubPr>
@@ -8889,7 +9840,7 @@
                         <m:dPr>
                           <m:ctrlPr>
                             <a:rPr lang="zh-CN" altLang="en-US" i="1">
-                              <a:latin typeface="Cambria Math" charset="0"/>
+                              <a:latin typeface="Cambria Math" panose="02040503050406030204" pitchFamily="18" charset="0"/>
                             </a:rPr>
                           </m:ctrlPr>
                         </m:dPr>
@@ -8907,7 +9858,7 @@
                               </m:mcs>
                               <m:ctrlPr>
                                 <a:rPr lang="zh-CN" altLang="en-US" i="1">
-                                  <a:latin typeface="Cambria Math" charset="0"/>
+                                  <a:latin typeface="Cambria Math" panose="02040503050406030204" pitchFamily="18" charset="0"/>
                                 </a:rPr>
                               </m:ctrlPr>
                             </m:mPr>
@@ -8937,7 +9888,7 @@
                                   <m:fPr>
                                     <m:ctrlPr>
                                       <a:rPr lang="zh-CN" altLang="en-US" i="1">
-                                        <a:latin typeface="Cambria Math" charset="0"/>
+                                        <a:latin typeface="Cambria Math" panose="02040503050406030204" pitchFamily="18" charset="0"/>
                                       </a:rPr>
                                     </m:ctrlPr>
                                   </m:fPr>
@@ -8946,7 +9897,7 @@
                                       <m:sSubPr>
                                         <m:ctrlPr>
                                           <a:rPr lang="zh-CN" altLang="en-US" i="1">
-                                            <a:latin typeface="Cambria Math" charset="0"/>
+                                            <a:latin typeface="Cambria Math" panose="02040503050406030204" pitchFamily="18" charset="0"/>
                                           </a:rPr>
                                         </m:ctrlPr>
                                       </m:sSubPr>
@@ -8971,7 +9922,7 @@
                                       <m:sSupPr>
                                         <m:ctrlPr>
                                           <a:rPr lang="zh-CN" altLang="en-US" i="1">
-                                            <a:latin typeface="Cambria Math" charset="0"/>
+                                            <a:latin typeface="Cambria Math" panose="02040503050406030204" pitchFamily="18" charset="0"/>
                                           </a:rPr>
                                         </m:ctrlPr>
                                       </m:sSupPr>
@@ -9002,7 +9953,7 @@
                                       <m:sSubPr>
                                         <m:ctrlPr>
                                           <a:rPr lang="zh-CN" altLang="en-US" i="1">
-                                            <a:latin typeface="Cambria Math" charset="0"/>
+                                            <a:latin typeface="Cambria Math" panose="02040503050406030204" pitchFamily="18" charset="0"/>
                                           </a:rPr>
                                         </m:ctrlPr>
                                       </m:sSubPr>
@@ -9047,7 +9998,7 @@
                                   <m:fPr>
                                     <m:ctrlPr>
                                       <a:rPr lang="zh-CN" altLang="en-US" i="1">
-                                        <a:latin typeface="Cambria Math" charset="0"/>
+                                        <a:latin typeface="Cambria Math" panose="02040503050406030204" pitchFamily="18" charset="0"/>
                                       </a:rPr>
                                     </m:ctrlPr>
                                   </m:fPr>
@@ -9062,7 +10013,7 @@
                                       <m:sSubPr>
                                         <m:ctrlPr>
                                           <a:rPr lang="zh-CN" altLang="en-US" i="1">
-                                            <a:latin typeface="Cambria Math" charset="0"/>
+                                            <a:latin typeface="Cambria Math" panose="02040503050406030204" pitchFamily="18" charset="0"/>
                                           </a:rPr>
                                         </m:ctrlPr>
                                       </m:sSubPr>
@@ -9191,7 +10142,7 @@
                         <m:dPr>
                           <m:ctrlPr>
                             <a:rPr lang="zh-CN" altLang="en-US" i="1">
-                              <a:latin typeface="Cambria Math" charset="0"/>
+                              <a:latin typeface="Cambria Math" panose="02040503050406030204" pitchFamily="18" charset="0"/>
                             </a:rPr>
                           </m:ctrlPr>
                         </m:dPr>
@@ -9209,7 +10160,7 @@
                               </m:mcs>
                               <m:ctrlPr>
                                 <a:rPr lang="zh-CN" altLang="en-US" i="1">
-                                  <a:latin typeface="Cambria Math" charset="0"/>
+                                  <a:latin typeface="Cambria Math" panose="02040503050406030204" pitchFamily="18" charset="0"/>
                                 </a:rPr>
                               </m:ctrlPr>
                             </m:mPr>
@@ -9377,7 +10328,7 @@
                         <m:dPr>
                           <m:ctrlPr>
                             <a:rPr lang="zh-CN" altLang="en-US" i="1">
-                              <a:latin typeface="Cambria Math" charset="0"/>
+                              <a:latin typeface="Cambria Math" panose="02040503050406030204" pitchFamily="18" charset="0"/>
                             </a:rPr>
                           </m:ctrlPr>
                         </m:dPr>
@@ -9395,7 +10346,7 @@
                               </m:mcs>
                               <m:ctrlPr>
                                 <a:rPr lang="zh-CN" altLang="en-US" i="1">
-                                  <a:latin typeface="Cambria Math" charset="0"/>
+                                  <a:latin typeface="Cambria Math" panose="02040503050406030204" pitchFamily="18" charset="0"/>
                                 </a:rPr>
                               </m:ctrlPr>
                             </m:mPr>
@@ -9515,7 +10466,7 @@
                         <m:dPr>
                           <m:ctrlPr>
                             <a:rPr lang="zh-CN" altLang="en-US" i="1">
-                              <a:latin typeface="Cambria Math" charset="0"/>
+                              <a:latin typeface="Cambria Math" panose="02040503050406030204" pitchFamily="18" charset="0"/>
                             </a:rPr>
                           </m:ctrlPr>
                         </m:dPr>
@@ -9524,7 +10475,7 @@
                             <m:sSubPr>
                               <m:ctrlPr>
                                 <a:rPr lang="zh-CN" altLang="en-US" i="1">
-                                  <a:latin typeface="Cambria Math" charset="0"/>
+                                  <a:latin typeface="Cambria Math" panose="02040503050406030204" pitchFamily="18" charset="0"/>
                                 </a:rPr>
                               </m:ctrlPr>
                             </m:sSubPr>
@@ -9555,7 +10506,7 @@
                             <m:sSubPr>
                               <m:ctrlPr>
                                 <a:rPr lang="zh-CN" altLang="en-US" i="1">
-                                  <a:latin typeface="Cambria Math" charset="0"/>
+                                  <a:latin typeface="Cambria Math" panose="02040503050406030204" pitchFamily="18" charset="0"/>
                                 </a:rPr>
                               </m:ctrlPr>
                             </m:sSubPr>
@@ -9580,7 +10531,7 @@
                             <m:sSupPr>
                               <m:ctrlPr>
                                 <a:rPr lang="zh-CN" altLang="en-US" i="1">
-                                  <a:latin typeface="Cambria Math" charset="0"/>
+                                  <a:latin typeface="Cambria Math" panose="02040503050406030204" pitchFamily="18" charset="0"/>
                                 </a:rPr>
                               </m:ctrlPr>
                             </m:sSupPr>
@@ -9611,7 +10562,7 @@
                             <m:sSubPr>
                               <m:ctrlPr>
                                 <a:rPr lang="zh-CN" altLang="en-US" i="1">
-                                  <a:latin typeface="Cambria Math" charset="0"/>
+                                  <a:latin typeface="Cambria Math" panose="02040503050406030204" pitchFamily="18" charset="0"/>
                                 </a:rPr>
                               </m:ctrlPr>
                             </m:sSubPr>
@@ -9636,7 +10587,7 @@
                             <m:sSupPr>
                               <m:ctrlPr>
                                 <a:rPr lang="zh-CN" altLang="en-US" i="1">
-                                  <a:latin typeface="Cambria Math" charset="0"/>
+                                  <a:latin typeface="Cambria Math" panose="02040503050406030204" pitchFamily="18" charset="0"/>
                                 </a:rPr>
                               </m:ctrlPr>
                             </m:sSupPr>
@@ -9663,7 +10614,7 @@
                         <m:dPr>
                           <m:ctrlPr>
                             <a:rPr lang="zh-CN" altLang="en-US" i="1">
-                              <a:latin typeface="Cambria Math" charset="0"/>
+                              <a:latin typeface="Cambria Math" panose="02040503050406030204" pitchFamily="18" charset="0"/>
                             </a:rPr>
                           </m:ctrlPr>
                         </m:dPr>
@@ -9672,7 +10623,7 @@
                             <m:sSubPr>
                               <m:ctrlPr>
                                 <a:rPr lang="zh-CN" altLang="en-US" i="1">
-                                  <a:latin typeface="Cambria Math" charset="0"/>
+                                  <a:latin typeface="Cambria Math" panose="02040503050406030204" pitchFamily="18" charset="0"/>
                                 </a:rPr>
                               </m:ctrlPr>
                             </m:sSubPr>
@@ -9682,7 +10633,7 @@
                                   <m:endChr m:val=""/>
                                   <m:ctrlPr>
                                     <a:rPr lang="zh-CN" altLang="en-US" i="1">
-                                      <a:latin typeface="Cambria Math" charset="0"/>
+                                      <a:latin typeface="Cambria Math" panose="02040503050406030204" pitchFamily="18" charset="0"/>
                                     </a:rPr>
                                   </m:ctrlPr>
                                 </m:dPr>
@@ -9715,7 +10666,7 @@
                             <m:sSubPr>
                               <m:ctrlPr>
                                 <a:rPr lang="zh-CN" altLang="en-US" i="1">
-                                  <a:latin typeface="Cambria Math" charset="0"/>
+                                  <a:latin typeface="Cambria Math" panose="02040503050406030204" pitchFamily="18" charset="0"/>
                                 </a:rPr>
                               </m:ctrlPr>
                             </m:sSubPr>
@@ -9740,7 +10691,7 @@
                             <m:sSupPr>
                               <m:ctrlPr>
                                 <a:rPr lang="zh-CN" altLang="en-US" i="1">
-                                  <a:latin typeface="Cambria Math" charset="0"/>
+                                  <a:latin typeface="Cambria Math" panose="02040503050406030204" pitchFamily="18" charset="0"/>
                                 </a:rPr>
                               </m:ctrlPr>
                             </m:sSupPr>
@@ -9773,7 +10724,7 @@
                         <m:sSupPr>
                           <m:ctrlPr>
                             <a:rPr lang="zh-CN" altLang="en-US" i="1">
-                              <a:latin typeface="Cambria Math" charset="0"/>
+                              <a:latin typeface="Cambria Math" panose="02040503050406030204" pitchFamily="18" charset="0"/>
                             </a:rPr>
                           </m:ctrlPr>
                         </m:sSupPr>
@@ -9782,7 +10733,7 @@
                             <m:dPr>
                               <m:ctrlPr>
                                 <a:rPr lang="zh-CN" altLang="en-US" i="1">
-                                  <a:latin typeface="Cambria Math" charset="0"/>
+                                  <a:latin typeface="Cambria Math" panose="02040503050406030204" pitchFamily="18" charset="0"/>
                                 </a:rPr>
                               </m:ctrlPr>
                             </m:dPr>
@@ -9791,7 +10742,7 @@
                                 <m:sSubPr>
                                   <m:ctrlPr>
                                     <a:rPr lang="zh-CN" altLang="en-US" i="1">
-                                      <a:latin typeface="Cambria Math" charset="0"/>
+                                      <a:latin typeface="Cambria Math" panose="02040503050406030204" pitchFamily="18" charset="0"/>
                                     </a:rPr>
                                   </m:ctrlPr>
                                 </m:sSubPr>
@@ -10026,7 +10977,7 @@
                         <m:sSupPr>
                           <m:ctrlPr>
                             <a:rPr lang="en-US" altLang="zh-CN" b="0" i="1" smtClean="0">
-                              <a:latin typeface="Cambria Math" charset="0"/>
+                              <a:latin typeface="Cambria Math" panose="02040503050406030204" pitchFamily="18" charset="0"/>
                             </a:rPr>
                           </m:ctrlPr>
                         </m:sSupPr>
@@ -10036,7 +10987,7 @@
                               <m:begChr m:val=""/>
                               <m:ctrlPr>
                                 <a:rPr lang="zh-CN" altLang="en-US" i="1" smtClean="0">
-                                  <a:latin typeface="Cambria Math" charset="0"/>
+                                  <a:latin typeface="Cambria Math" panose="02040503050406030204" pitchFamily="18" charset="0"/>
                                 </a:rPr>
                               </m:ctrlPr>
                             </m:dPr>
@@ -10066,7 +11017,7 @@
                                   </m:mcs>
                                   <m:ctrlPr>
                                     <a:rPr lang="zh-CN" altLang="en-US" i="1">
-                                      <a:latin typeface="Cambria Math" charset="0"/>
+                                      <a:latin typeface="Cambria Math" panose="02040503050406030204" pitchFamily="18" charset="0"/>
                                     </a:rPr>
                                   </m:ctrlPr>
                                 </m:mPr>
@@ -10093,7 +11044,7 @@
                                         <m:chr m:val="̇"/>
                                         <m:ctrlPr>
                                           <a:rPr lang="zh-CN" altLang="en-US" i="1">
-                                            <a:latin typeface="Cambria Math" charset="0"/>
+                                            <a:latin typeface="Cambria Math" panose="02040503050406030204" pitchFamily="18" charset="0"/>
                                           </a:rPr>
                                         </m:ctrlPr>
                                       </m:accPr>
@@ -10113,7 +11064,7 @@
                                         <m:chr m:val="̇"/>
                                         <m:ctrlPr>
                                           <a:rPr lang="zh-CN" altLang="en-US" i="1">
-                                            <a:latin typeface="Cambria Math" charset="0"/>
+                                            <a:latin typeface="Cambria Math" panose="02040503050406030204" pitchFamily="18" charset="0"/>
                                           </a:rPr>
                                         </m:ctrlPr>
                                       </m:accPr>
@@ -10234,7 +11185,7 @@
                         <m:dPr>
                           <m:ctrlPr>
                             <a:rPr lang="zh-CN" altLang="en-US" i="1">
-                              <a:latin typeface="Cambria Math" charset="0"/>
+                              <a:latin typeface="Cambria Math" panose="02040503050406030204" pitchFamily="18" charset="0"/>
                             </a:rPr>
                           </m:ctrlPr>
                         </m:dPr>
@@ -10252,7 +11203,7 @@
                               </m:mcs>
                               <m:ctrlPr>
                                 <a:rPr lang="zh-CN" altLang="en-US" i="1">
-                                  <a:latin typeface="Cambria Math" charset="0"/>
+                                  <a:latin typeface="Cambria Math" panose="02040503050406030204" pitchFamily="18" charset="0"/>
                                 </a:rPr>
                               </m:ctrlPr>
                             </m:mPr>
@@ -10420,7 +11371,7 @@
                         <m:dPr>
                           <m:ctrlPr>
                             <a:rPr lang="zh-CN" altLang="en-US" i="1">
-                              <a:latin typeface="Cambria Math" charset="0"/>
+                              <a:latin typeface="Cambria Math" panose="02040503050406030204" pitchFamily="18" charset="0"/>
                             </a:rPr>
                           </m:ctrlPr>
                         </m:dPr>
@@ -10438,7 +11389,7 @@
                               </m:mcs>
                               <m:ctrlPr>
                                 <a:rPr lang="zh-CN" altLang="en-US" i="1">
-                                  <a:latin typeface="Cambria Math" charset="0"/>
+                                  <a:latin typeface="Cambria Math" panose="02040503050406030204" pitchFamily="18" charset="0"/>
                                 </a:rPr>
                               </m:ctrlPr>
                             </m:mPr>
@@ -10558,7 +11509,7 @@
                         <m:dPr>
                           <m:ctrlPr>
                             <a:rPr lang="zh-CN" altLang="en-US" i="1">
-                              <a:latin typeface="Cambria Math" charset="0"/>
+                              <a:latin typeface="Cambria Math" panose="02040503050406030204" pitchFamily="18" charset="0"/>
                             </a:rPr>
                           </m:ctrlPr>
                         </m:dPr>
@@ -10576,7 +11527,7 @@
                               </m:mcs>
                               <m:ctrlPr>
                                 <a:rPr lang="zh-CN" altLang="en-US" i="1">
-                                  <a:latin typeface="Cambria Math" charset="0"/>
+                                  <a:latin typeface="Cambria Math" panose="02040503050406030204" pitchFamily="18" charset="0"/>
                                 </a:rPr>
                               </m:ctrlPr>
                             </m:mPr>
@@ -10812,7 +11763,7 @@
                         <m:dPr>
                           <m:ctrlPr>
                             <a:rPr lang="zh-CN" altLang="en-US" i="1">
-                              <a:latin typeface="Cambria Math" charset="0"/>
+                              <a:latin typeface="Cambria Math" panose="02040503050406030204" pitchFamily="18" charset="0"/>
                             </a:rPr>
                           </m:ctrlPr>
                         </m:dPr>
@@ -10830,7 +11781,7 @@
                               </m:mcs>
                               <m:ctrlPr>
                                 <a:rPr lang="zh-CN" altLang="en-US" i="1">
-                                  <a:latin typeface="Cambria Math" charset="0"/>
+                                  <a:latin typeface="Cambria Math" panose="02040503050406030204" pitchFamily="18" charset="0"/>
                                 </a:rPr>
                               </m:ctrlPr>
                             </m:mPr>
@@ -10958,7 +11909,7 @@
                         <m:sSubPr>
                           <m:ctrlPr>
                             <a:rPr lang="zh-CN" altLang="zh-CN" i="1" kern="100">
-                              <a:latin typeface="Cambria Math" charset="0"/>
+                              <a:latin typeface="Cambria Math" panose="02040503050406030204" pitchFamily="18" charset="0"/>
                               <a:ea typeface="Cambria Math" charset="0"/>
                               <a:cs typeface="Times New Roman" charset="0"/>
                             </a:rPr>
@@ -11001,7 +11952,7 @@
                           <m:ctrlPr>
                             <a:rPr lang="zh-CN" altLang="zh-CN" i="1" kern="100">
                               <a:effectLst/>
-                              <a:latin typeface="Cambria Math" charset="0"/>
+                              <a:latin typeface="Cambria Math" panose="02040503050406030204" pitchFamily="18" charset="0"/>
                               <a:ea typeface="Cambria Math" charset="0"/>
                               <a:cs typeface="Times New Roman" charset="0"/>
                             </a:rPr>
@@ -11080,7 +12031,7 @@
                           <m:ctrlPr>
                             <a:rPr lang="zh-CN" altLang="zh-CN" i="1" kern="100">
                               <a:effectLst/>
-                              <a:latin typeface="Cambria Math" charset="0"/>
+                              <a:latin typeface="Cambria Math" panose="02040503050406030204" pitchFamily="18" charset="0"/>
                               <a:ea typeface="Cambria Math" charset="0"/>
                               <a:cs typeface="Times New Roman" charset="0"/>
                             </a:rPr>
@@ -11123,7 +12074,7 @@
                           <m:ctrlPr>
                             <a:rPr lang="zh-CN" altLang="zh-CN" i="1" kern="100">
                               <a:effectLst/>
-                              <a:latin typeface="Cambria Math" charset="0"/>
+                              <a:latin typeface="Cambria Math" panose="02040503050406030204" pitchFamily="18" charset="0"/>
                               <a:ea typeface="Cambria Math" charset="0"/>
                               <a:cs typeface="Times New Roman" charset="0"/>
                             </a:rPr>
@@ -11325,7 +12276,7 @@
                         <m:dPr>
                           <m:ctrlPr>
                             <a:rPr lang="zh-CN" altLang="en-US" i="1">
-                              <a:latin typeface="Cambria Math" charset="0"/>
+                              <a:latin typeface="Cambria Math" panose="02040503050406030204" pitchFamily="18" charset="0"/>
                             </a:rPr>
                           </m:ctrlPr>
                         </m:dPr>
@@ -11334,7 +12285,7 @@
                             <m:sSubPr>
                               <m:ctrlPr>
                                 <a:rPr lang="zh-CN" altLang="en-US" i="1">
-                                  <a:latin typeface="Cambria Math" charset="0"/>
+                                  <a:latin typeface="Cambria Math" panose="02040503050406030204" pitchFamily="18" charset="0"/>
                                 </a:rPr>
                               </m:ctrlPr>
                             </m:sSubPr>
@@ -11414,6 +12365,1598 @@
     <p:extLst>
       <p:ext uri="{BB962C8B-B14F-4D97-AF65-F5344CB8AC3E}">
         <p14:creationId xmlns:p14="http://schemas.microsoft.com/office/powerpoint/2010/main" val="1176771568"/>
+      </p:ext>
+    </p:extLst>
+  </p:cSld>
+  <p:clrMapOvr>
+    <a:masterClrMapping/>
+  </p:clrMapOvr>
+  <p:timing>
+    <p:tnLst>
+      <p:par>
+        <p:cTn id="1" dur="indefinite" restart="never" nodeType="tmRoot"/>
+      </p:par>
+    </p:tnLst>
+  </p:timing>
+</p:sld>
+</file>
+
+<file path=ppt/slides/slide7.xml><?xml version="1.0" encoding="utf-8"?>
+<p:sld xmlns:a="http://schemas.openxmlformats.org/drawingml/2006/main" xmlns:r="http://schemas.openxmlformats.org/officeDocument/2006/relationships" xmlns:p="http://schemas.openxmlformats.org/presentationml/2006/main">
+  <p:cSld>
+    <p:spTree>
+      <p:nvGrpSpPr>
+        <p:cNvPr id="1" name=""/>
+        <p:cNvGrpSpPr/>
+        <p:nvPr/>
+      </p:nvGrpSpPr>
+      <p:grpSpPr>
+        <a:xfrm>
+          <a:off x="0" y="0"/>
+          <a:ext cx="0" cy="0"/>
+          <a:chOff x="0" y="0"/>
+          <a:chExt cx="0" cy="0"/>
+        </a:xfrm>
+      </p:grpSpPr>
+      <p:sp>
+        <p:nvSpPr>
+          <p:cNvPr id="2" name="标题 1"/>
+          <p:cNvSpPr>
+            <a:spLocks noGrp="1"/>
+          </p:cNvSpPr>
+          <p:nvPr>
+            <p:ph type="title"/>
+          </p:nvPr>
+        </p:nvSpPr>
+        <p:spPr>
+          <a:xfrm>
+            <a:off x="1371600" y="178370"/>
+            <a:ext cx="9601200" cy="753533"/>
+          </a:xfrm>
+        </p:spPr>
+        <p:txBody>
+          <a:bodyPr/>
+          <a:lstStyle/>
+          <a:p>
+            <a:r>
+              <a:rPr kumimoji="1" lang="zh-CN" altLang="en-US" b="1" dirty="0" smtClean="0"/>
+              <a:t>状态反馈控制</a:t>
+            </a:r>
+            <a:endParaRPr kumimoji="1" lang="zh-CN" altLang="en-US" b="1" dirty="0"/>
+          </a:p>
+        </p:txBody>
+      </p:sp>
+      <p:sp>
+        <p:nvSpPr>
+          <p:cNvPr id="3" name="内容占位符 2"/>
+          <p:cNvSpPr>
+            <a:spLocks noGrp="1"/>
+          </p:cNvSpPr>
+          <p:nvPr>
+            <p:ph idx="1"/>
+          </p:nvPr>
+        </p:nvSpPr>
+        <p:spPr>
+          <a:xfrm>
+            <a:off x="1371600" y="965199"/>
+            <a:ext cx="9601200" cy="2017422"/>
+          </a:xfrm>
+        </p:spPr>
+        <p:txBody>
+          <a:bodyPr>
+            <a:normAutofit lnSpcReduction="10000"/>
+          </a:bodyPr>
+          <a:lstStyle/>
+          <a:p>
+            <a:r>
+              <a:rPr kumimoji="1" lang="zh-CN" altLang="en-US" b="1" dirty="0" smtClean="0"/>
+              <a:t>目标极点位置：</a:t>
+            </a:r>
+            <a:endParaRPr kumimoji="1" lang="en-US" altLang="zh-CN" b="1" dirty="0" smtClean="0"/>
+          </a:p>
+          <a:p>
+            <a:endParaRPr kumimoji="1" lang="en-US" altLang="zh-CN" b="1" dirty="0" smtClean="0"/>
+          </a:p>
+          <a:p>
+            <a:r>
+              <a:rPr kumimoji="1" lang="zh-CN" altLang="en-US" b="1" dirty="0" smtClean="0"/>
+              <a:t>使用状态反馈：</a:t>
+            </a:r>
+            <a:endParaRPr kumimoji="1" lang="en-US" altLang="zh-CN" b="1" dirty="0" smtClean="0"/>
+          </a:p>
+          <a:p>
+            <a:endParaRPr kumimoji="1" lang="en-US" altLang="zh-CN" b="1" dirty="0" smtClean="0"/>
+          </a:p>
+          <a:p>
+            <a:r>
+              <a:rPr kumimoji="1" lang="zh-CN" altLang="en-US" b="1" dirty="0" smtClean="0"/>
+              <a:t>鉴于系统能控，使用</a:t>
+            </a:r>
+            <a:r>
+              <a:rPr kumimoji="1" lang="en-US" altLang="zh-CN" b="1" dirty="0" smtClean="0"/>
+              <a:t>MATLAB</a:t>
+            </a:r>
+            <a:r>
+              <a:rPr kumimoji="1" lang="zh-CN" altLang="en-US" b="1" dirty="0" smtClean="0"/>
+              <a:t>内置函数</a:t>
+            </a:r>
+            <a:r>
+              <a:rPr kumimoji="1" lang="en-US" altLang="zh-CN" b="1" dirty="0" smtClean="0"/>
+              <a:t>acker()</a:t>
+            </a:r>
+            <a:r>
+              <a:rPr kumimoji="1" lang="zh-CN" altLang="en-US" b="1" dirty="0" smtClean="0"/>
+              <a:t>自动配置反馈矩阵</a:t>
+            </a:r>
+            <a:r>
+              <a:rPr kumimoji="1" lang="en-US" altLang="zh-CN" b="1" dirty="0" smtClean="0"/>
+              <a:t>K</a:t>
+            </a:r>
+          </a:p>
+          <a:p>
+            <a:pPr marL="0" indent="0">
+              <a:buNone/>
+            </a:pPr>
+            <a:endParaRPr kumimoji="1" lang="en-US" altLang="zh-CN" b="1" dirty="0" smtClean="0"/>
+          </a:p>
+        </p:txBody>
+      </p:sp>
+      <mc:AlternateContent xmlns:mc="http://schemas.openxmlformats.org/markup-compatibility/2006" xmlns:a14="http://schemas.microsoft.com/office/drawing/2010/main">
+        <mc:Choice Requires="a14">
+          <p:sp>
+            <p:nvSpPr>
+              <p:cNvPr id="7" name="矩形 6"/>
+              <p:cNvSpPr/>
+              <p:nvPr/>
+            </p:nvSpPr>
+            <p:spPr>
+              <a:xfrm>
+                <a:off x="1562902" y="5032496"/>
+                <a:ext cx="2123530" cy="554254"/>
+              </a:xfrm>
+              <a:prstGeom prst="rect">
+                <a:avLst/>
+              </a:prstGeom>
+            </p:spPr>
+            <p:txBody>
+              <a:bodyPr wrap="none">
+                <a:spAutoFit/>
+              </a:bodyPr>
+              <a:lstStyle/>
+              <a:p>
+                <a:pPr/>
+                <a14:m>
+                  <m:oMathPara xmlns:m="http://schemas.openxmlformats.org/officeDocument/2006/math">
+                    <m:oMathParaPr>
+                      <m:jc m:val="centerGroup"/>
+                    </m:oMathParaPr>
+                    <m:oMath xmlns:m="http://schemas.openxmlformats.org/officeDocument/2006/math">
+                      <m:r>
+                        <a:rPr lang="zh-CN" altLang="en-US" i="1">
+                          <a:latin typeface="Cambria Math" charset="0"/>
+                        </a:rPr>
+                        <m:t>𝐶</m:t>
+                      </m:r>
+                      <m:r>
+                        <a:rPr lang="zh-CN" altLang="en-US" i="0">
+                          <a:latin typeface="Cambria Math" charset="0"/>
+                        </a:rPr>
+                        <m:t>=</m:t>
+                      </m:r>
+                      <m:d>
+                        <m:dPr>
+                          <m:ctrlPr>
+                            <a:rPr lang="zh-CN" altLang="en-US" i="1">
+                              <a:latin typeface="Cambria Math" panose="02040503050406030204" pitchFamily="18" charset="0"/>
+                            </a:rPr>
+                          </m:ctrlPr>
+                        </m:dPr>
+                        <m:e>
+                          <m:m>
+                            <m:mPr>
+                              <m:plcHide m:val="on"/>
+                              <m:mcs>
+                                <m:mc>
+                                  <m:mcPr>
+                                    <m:count m:val="4"/>
+                                    <m:mcJc m:val="center"/>
+                                  </m:mcPr>
+                                </m:mc>
+                              </m:mcs>
+                              <m:ctrlPr>
+                                <a:rPr lang="zh-CN" altLang="en-US" i="1">
+                                  <a:latin typeface="Cambria Math" panose="02040503050406030204" pitchFamily="18" charset="0"/>
+                                </a:rPr>
+                              </m:ctrlPr>
+                            </m:mPr>
+                            <m:mr>
+                              <m:e>
+                                <m:r>
+                                  <a:rPr lang="zh-CN" altLang="en-US" i="0">
+                                    <a:latin typeface="Cambria Math" charset="0"/>
+                                  </a:rPr>
+                                  <m:t>1</m:t>
+                                </m:r>
+                              </m:e>
+                              <m:e>
+                                <m:r>
+                                  <a:rPr lang="zh-CN" altLang="en-US" i="0">
+                                    <a:latin typeface="Cambria Math" charset="0"/>
+                                  </a:rPr>
+                                  <m:t>0</m:t>
+                                </m:r>
+                              </m:e>
+                              <m:e>
+                                <m:r>
+                                  <a:rPr lang="zh-CN" altLang="en-US" i="0">
+                                    <a:latin typeface="Cambria Math" charset="0"/>
+                                  </a:rPr>
+                                  <m:t>0</m:t>
+                                </m:r>
+                              </m:e>
+                              <m:e>
+                                <m:r>
+                                  <a:rPr lang="zh-CN" altLang="en-US" i="0">
+                                    <a:latin typeface="Cambria Math" charset="0"/>
+                                  </a:rPr>
+                                  <m:t>0</m:t>
+                                </m:r>
+                              </m:e>
+                            </m:mr>
+                            <m:mr>
+                              <m:e>
+                                <m:r>
+                                  <a:rPr lang="zh-CN" altLang="en-US" i="0">
+                                    <a:latin typeface="Cambria Math" charset="0"/>
+                                  </a:rPr>
+                                  <m:t>0</m:t>
+                                </m:r>
+                              </m:e>
+                              <m:e>
+                                <m:r>
+                                  <a:rPr lang="zh-CN" altLang="en-US" i="0">
+                                    <a:latin typeface="Cambria Math" charset="0"/>
+                                  </a:rPr>
+                                  <m:t>1</m:t>
+                                </m:r>
+                              </m:e>
+                              <m:e>
+                                <m:r>
+                                  <a:rPr lang="zh-CN" altLang="en-US" i="0">
+                                    <a:latin typeface="Cambria Math" charset="0"/>
+                                  </a:rPr>
+                                  <m:t>0</m:t>
+                                </m:r>
+                              </m:e>
+                              <m:e>
+                                <m:r>
+                                  <a:rPr lang="zh-CN" altLang="en-US" i="0">
+                                    <a:latin typeface="Cambria Math" charset="0"/>
+                                  </a:rPr>
+                                  <m:t>0</m:t>
+                                </m:r>
+                              </m:e>
+                            </m:mr>
+                          </m:m>
+                        </m:e>
+                      </m:d>
+                    </m:oMath>
+                  </m:oMathPara>
+                </a14:m>
+                <a:endParaRPr lang="zh-CN" altLang="en-US" dirty="0"/>
+              </a:p>
+            </p:txBody>
+          </p:sp>
+        </mc:Choice>
+        <mc:Fallback xmlns="">
+          <p:sp>
+            <p:nvSpPr>
+              <p:cNvPr id="7" name="矩形 6"/>
+              <p:cNvSpPr>
+                <a:spLocks noRot="1" noChangeAspect="1" noMove="1" noResize="1" noEditPoints="1" noAdjustHandles="1" noChangeArrowheads="1" noChangeShapeType="1" noTextEdit="1"/>
+              </p:cNvSpPr>
+              <p:nvPr/>
+            </p:nvSpPr>
+            <p:spPr>
+              <a:xfrm>
+                <a:off x="1562902" y="5032496"/>
+                <a:ext cx="2123530" cy="554254"/>
+              </a:xfrm>
+              <a:prstGeom prst="rect">
+                <a:avLst/>
+              </a:prstGeom>
+              <a:blipFill rotWithShape="0">
+                <a:blip r:embed="rId2"/>
+                <a:stretch>
+                  <a:fillRect/>
+                </a:stretch>
+              </a:blipFill>
+            </p:spPr>
+            <p:txBody>
+              <a:bodyPr/>
+              <a:lstStyle/>
+              <a:p>
+                <a:r>
+                  <a:rPr lang="zh-CN" altLang="en-US">
+                    <a:noFill/>
+                  </a:rPr>
+                  <a:t> </a:t>
+                </a:r>
+              </a:p>
+            </p:txBody>
+          </p:sp>
+        </mc:Fallback>
+      </mc:AlternateContent>
+      <mc:AlternateContent xmlns:mc="http://schemas.openxmlformats.org/markup-compatibility/2006" xmlns:a14="http://schemas.microsoft.com/office/drawing/2010/main">
+        <mc:Choice Requires="a14">
+          <p:sp>
+            <p:nvSpPr>
+              <p:cNvPr id="8" name="矩形 7"/>
+              <p:cNvSpPr/>
+              <p:nvPr/>
+            </p:nvSpPr>
+            <p:spPr>
+              <a:xfrm>
+                <a:off x="4411855" y="5026953"/>
+                <a:ext cx="1065356" cy="554254"/>
+              </a:xfrm>
+              <a:prstGeom prst="rect">
+                <a:avLst/>
+              </a:prstGeom>
+            </p:spPr>
+            <p:txBody>
+              <a:bodyPr wrap="none">
+                <a:spAutoFit/>
+              </a:bodyPr>
+              <a:lstStyle/>
+              <a:p>
+                <a:pPr/>
+                <a14:m>
+                  <m:oMathPara xmlns:m="http://schemas.openxmlformats.org/officeDocument/2006/math">
+                    <m:oMathParaPr>
+                      <m:jc m:val="centerGroup"/>
+                    </m:oMathParaPr>
+                    <m:oMath xmlns:m="http://schemas.openxmlformats.org/officeDocument/2006/math">
+                      <m:r>
+                        <a:rPr lang="zh-CN" altLang="en-US" i="1">
+                          <a:latin typeface="Cambria Math" charset="0"/>
+                        </a:rPr>
+                        <m:t>𝐷</m:t>
+                      </m:r>
+                      <m:r>
+                        <a:rPr lang="zh-CN" altLang="en-US" i="0">
+                          <a:latin typeface="Cambria Math" charset="0"/>
+                        </a:rPr>
+                        <m:t>=</m:t>
+                      </m:r>
+                      <m:d>
+                        <m:dPr>
+                          <m:ctrlPr>
+                            <a:rPr lang="zh-CN" altLang="en-US" i="1">
+                              <a:latin typeface="Cambria Math" panose="02040503050406030204" pitchFamily="18" charset="0"/>
+                            </a:rPr>
+                          </m:ctrlPr>
+                        </m:dPr>
+                        <m:e>
+                          <m:m>
+                            <m:mPr>
+                              <m:plcHide m:val="on"/>
+                              <m:mcs>
+                                <m:mc>
+                                  <m:mcPr>
+                                    <m:count m:val="1"/>
+                                    <m:mcJc m:val="center"/>
+                                  </m:mcPr>
+                                </m:mc>
+                              </m:mcs>
+                              <m:ctrlPr>
+                                <a:rPr lang="zh-CN" altLang="en-US" i="1">
+                                  <a:latin typeface="Cambria Math" panose="02040503050406030204" pitchFamily="18" charset="0"/>
+                                </a:rPr>
+                              </m:ctrlPr>
+                            </m:mPr>
+                            <m:mr>
+                              <m:e>
+                                <m:r>
+                                  <a:rPr lang="zh-CN" altLang="en-US" i="0">
+                                    <a:latin typeface="Cambria Math" charset="0"/>
+                                  </a:rPr>
+                                  <m:t>0</m:t>
+                                </m:r>
+                              </m:e>
+                            </m:mr>
+                            <m:mr>
+                              <m:e>
+                                <m:r>
+                                  <a:rPr lang="zh-CN" altLang="en-US" i="0">
+                                    <a:latin typeface="Cambria Math" charset="0"/>
+                                  </a:rPr>
+                                  <m:t>0</m:t>
+                                </m:r>
+                              </m:e>
+                            </m:mr>
+                          </m:m>
+                        </m:e>
+                      </m:d>
+                    </m:oMath>
+                  </m:oMathPara>
+                </a14:m>
+                <a:endParaRPr lang="zh-CN" altLang="en-US" dirty="0"/>
+              </a:p>
+            </p:txBody>
+          </p:sp>
+        </mc:Choice>
+        <mc:Fallback xmlns="">
+          <p:sp>
+            <p:nvSpPr>
+              <p:cNvPr id="8" name="矩形 7"/>
+              <p:cNvSpPr>
+                <a:spLocks noRot="1" noChangeAspect="1" noMove="1" noResize="1" noEditPoints="1" noAdjustHandles="1" noChangeArrowheads="1" noChangeShapeType="1" noTextEdit="1"/>
+              </p:cNvSpPr>
+              <p:nvPr/>
+            </p:nvSpPr>
+            <p:spPr>
+              <a:xfrm>
+                <a:off x="4411855" y="5026953"/>
+                <a:ext cx="1065356" cy="554254"/>
+              </a:xfrm>
+              <a:prstGeom prst="rect">
+                <a:avLst/>
+              </a:prstGeom>
+              <a:blipFill rotWithShape="0">
+                <a:blip r:embed="rId3"/>
+                <a:stretch>
+                  <a:fillRect/>
+                </a:stretch>
+              </a:blipFill>
+            </p:spPr>
+            <p:txBody>
+              <a:bodyPr/>
+              <a:lstStyle/>
+              <a:p>
+                <a:r>
+                  <a:rPr lang="zh-CN" altLang="en-US">
+                    <a:noFill/>
+                  </a:rPr>
+                  <a:t> </a:t>
+                </a:r>
+              </a:p>
+            </p:txBody>
+          </p:sp>
+        </mc:Fallback>
+      </mc:AlternateContent>
+      <mc:AlternateContent xmlns:mc="http://schemas.openxmlformats.org/markup-compatibility/2006" xmlns:a14="http://schemas.microsoft.com/office/drawing/2010/main">
+        <mc:Choice Requires="a14">
+          <p:sp>
+            <p:nvSpPr>
+              <p:cNvPr id="11" name="矩形 10"/>
+              <p:cNvSpPr/>
+              <p:nvPr/>
+            </p:nvSpPr>
+            <p:spPr>
+              <a:xfrm>
+                <a:off x="6222511" y="3658530"/>
+                <a:ext cx="1903213" cy="1126975"/>
+              </a:xfrm>
+              <a:prstGeom prst="rect">
+                <a:avLst/>
+              </a:prstGeom>
+            </p:spPr>
+            <p:txBody>
+              <a:bodyPr wrap="none">
+                <a:spAutoFit/>
+              </a:bodyPr>
+              <a:lstStyle/>
+              <a:p>
+                <a:pPr/>
+                <a14:m>
+                  <m:oMathPara xmlns:m="http://schemas.openxmlformats.org/officeDocument/2006/math">
+                    <m:oMathParaPr>
+                      <m:jc m:val="centerGroup"/>
+                    </m:oMathParaPr>
+                    <m:oMath xmlns:m="http://schemas.openxmlformats.org/officeDocument/2006/math">
+                      <m:r>
+                        <a:rPr lang="zh-CN" altLang="en-US" i="1">
+                          <a:latin typeface="Cambria Math" charset="0"/>
+                        </a:rPr>
+                        <m:t>𝐵</m:t>
+                      </m:r>
+                      <m:r>
+                        <a:rPr lang="zh-CN" altLang="en-US" i="0">
+                          <a:latin typeface="Cambria Math" charset="0"/>
+                        </a:rPr>
+                        <m:t>=</m:t>
+                      </m:r>
+                      <m:d>
+                        <m:dPr>
+                          <m:ctrlPr>
+                            <a:rPr lang="zh-CN" altLang="en-US" i="1">
+                              <a:latin typeface="Cambria Math" panose="02040503050406030204" pitchFamily="18" charset="0"/>
+                            </a:rPr>
+                          </m:ctrlPr>
+                        </m:dPr>
+                        <m:e>
+                          <m:m>
+                            <m:mPr>
+                              <m:plcHide m:val="on"/>
+                              <m:mcs>
+                                <m:mc>
+                                  <m:mcPr>
+                                    <m:count m:val="1"/>
+                                    <m:mcJc m:val="center"/>
+                                  </m:mcPr>
+                                </m:mc>
+                              </m:mcs>
+                              <m:ctrlPr>
+                                <a:rPr lang="zh-CN" altLang="en-US" i="1">
+                                  <a:latin typeface="Cambria Math" panose="02040503050406030204" pitchFamily="18" charset="0"/>
+                                </a:rPr>
+                              </m:ctrlPr>
+                            </m:mPr>
+                            <m:mr>
+                              <m:e>
+                                <m:r>
+                                  <a:rPr lang="zh-CN" altLang="en-US" i="0">
+                                    <a:latin typeface="Cambria Math" charset="0"/>
+                                  </a:rPr>
+                                  <m:t>0</m:t>
+                                </m:r>
+                              </m:e>
+                            </m:mr>
+                            <m:mr>
+                              <m:e>
+                                <m:r>
+                                  <a:rPr lang="zh-CN" altLang="en-US" i="0">
+                                    <a:latin typeface="Cambria Math" charset="0"/>
+                                  </a:rPr>
+                                  <m:t>0</m:t>
+                                </m:r>
+                              </m:e>
+                            </m:mr>
+                            <m:mr>
+                              <m:e>
+                                <m:r>
+                                  <a:rPr lang="zh-CN" altLang="en-US" i="0">
+                                    <a:latin typeface="Cambria Math" charset="0"/>
+                                  </a:rPr>
+                                  <m:t>   0.9221</m:t>
+                                </m:r>
+                              </m:e>
+                            </m:mr>
+                            <m:mr>
+                              <m:e>
+                                <m:r>
+                                  <a:rPr lang="zh-CN" altLang="en-US" i="0">
+                                    <a:latin typeface="Cambria Math" charset="0"/>
+                                  </a:rPr>
+                                  <m:t>−0.2019</m:t>
+                                </m:r>
+                              </m:e>
+                            </m:mr>
+                          </m:m>
+                        </m:e>
+                      </m:d>
+                    </m:oMath>
+                  </m:oMathPara>
+                </a14:m>
+                <a:endParaRPr lang="zh-CN" altLang="en-US" dirty="0"/>
+              </a:p>
+            </p:txBody>
+          </p:sp>
+        </mc:Choice>
+        <mc:Fallback xmlns="">
+          <p:sp>
+            <p:nvSpPr>
+              <p:cNvPr id="11" name="矩形 10"/>
+              <p:cNvSpPr>
+                <a:spLocks noRot="1" noChangeAspect="1" noMove="1" noResize="1" noEditPoints="1" noAdjustHandles="1" noChangeArrowheads="1" noChangeShapeType="1" noTextEdit="1"/>
+              </p:cNvSpPr>
+              <p:nvPr/>
+            </p:nvSpPr>
+            <p:spPr>
+              <a:xfrm>
+                <a:off x="6222511" y="3658530"/>
+                <a:ext cx="1903213" cy="1126975"/>
+              </a:xfrm>
+              <a:prstGeom prst="rect">
+                <a:avLst/>
+              </a:prstGeom>
+              <a:blipFill rotWithShape="0">
+                <a:blip r:embed="rId4"/>
+                <a:stretch>
+                  <a:fillRect/>
+                </a:stretch>
+              </a:blipFill>
+            </p:spPr>
+            <p:txBody>
+              <a:bodyPr/>
+              <a:lstStyle/>
+              <a:p>
+                <a:r>
+                  <a:rPr lang="zh-CN" altLang="en-US">
+                    <a:noFill/>
+                  </a:rPr>
+                  <a:t> </a:t>
+                </a:r>
+              </a:p>
+            </p:txBody>
+          </p:sp>
+        </mc:Fallback>
+      </mc:AlternateContent>
+      <mc:AlternateContent xmlns:mc="http://schemas.openxmlformats.org/markup-compatibility/2006" xmlns:a14="http://schemas.microsoft.com/office/drawing/2010/main">
+        <mc:Choice Requires="a14">
+          <p:sp>
+            <p:nvSpPr>
+              <p:cNvPr id="5" name="矩形 4"/>
+              <p:cNvSpPr/>
+              <p:nvPr/>
+            </p:nvSpPr>
+            <p:spPr>
+              <a:xfrm>
+                <a:off x="1562902" y="1373892"/>
+                <a:ext cx="2764090" cy="369332"/>
+              </a:xfrm>
+              <a:prstGeom prst="rect">
+                <a:avLst/>
+              </a:prstGeom>
+            </p:spPr>
+            <p:txBody>
+              <a:bodyPr wrap="none">
+                <a:spAutoFit/>
+              </a:bodyPr>
+              <a:lstStyle/>
+              <a:p>
+                <a:pPr/>
+                <a14:m>
+                  <m:oMathPara xmlns:m="http://schemas.openxmlformats.org/officeDocument/2006/math">
+                    <m:oMathParaPr>
+                      <m:jc m:val="centerGroup"/>
+                    </m:oMathParaPr>
+                    <m:oMath xmlns:m="http://schemas.openxmlformats.org/officeDocument/2006/math">
+                      <m:d>
+                        <m:dPr>
+                          <m:begChr m:val=""/>
+                          <m:ctrlPr>
+                            <a:rPr lang="zh-CN" altLang="en-US" i="1">
+                              <a:latin typeface="Cambria Math" panose="02040503050406030204" pitchFamily="18" charset="0"/>
+                            </a:rPr>
+                          </m:ctrlPr>
+                        </m:dPr>
+                        <m:e>
+                          <m:r>
+                            <a:rPr lang="zh-CN" altLang="en-US" i="1">
+                              <a:latin typeface="Cambria Math" charset="0"/>
+                            </a:rPr>
+                            <m:t>𝑥</m:t>
+                          </m:r>
+                          <m:r>
+                            <a:rPr lang="zh-CN" altLang="en-US" i="0">
+                              <a:latin typeface="Cambria Math" charset="0"/>
+                            </a:rPr>
+                            <m:t>=(</m:t>
+                          </m:r>
+                          <m:m>
+                            <m:mPr>
+                              <m:plcHide m:val="on"/>
+                              <m:mcs>
+                                <m:mc>
+                                  <m:mcPr>
+                                    <m:count m:val="4"/>
+                                    <m:mcJc m:val="center"/>
+                                  </m:mcPr>
+                                </m:mc>
+                              </m:mcs>
+                              <m:ctrlPr>
+                                <a:rPr lang="zh-CN" altLang="en-US" i="1">
+                                  <a:latin typeface="Cambria Math" panose="02040503050406030204" pitchFamily="18" charset="0"/>
+                                </a:rPr>
+                              </m:ctrlPr>
+                            </m:mPr>
+                            <m:mr>
+                              <m:e>
+                                <m:r>
+                                  <a:rPr lang="zh-CN" altLang="en-US" i="0">
+                                    <a:latin typeface="Cambria Math" charset="0"/>
+                                  </a:rPr>
+                                  <m:t>−3</m:t>
+                                </m:r>
+                              </m:e>
+                              <m:e>
+                                <m:r>
+                                  <a:rPr lang="zh-CN" altLang="en-US" i="0">
+                                    <a:latin typeface="Cambria Math" charset="0"/>
+                                  </a:rPr>
+                                  <m:t>−3</m:t>
+                                </m:r>
+                              </m:e>
+                              <m:e>
+                                <m:r>
+                                  <a:rPr lang="zh-CN" altLang="en-US" i="0">
+                                    <a:latin typeface="Cambria Math" charset="0"/>
+                                  </a:rPr>
+                                  <m:t>−4</m:t>
+                                </m:r>
+                              </m:e>
+                              <m:e>
+                                <m:r>
+                                  <a:rPr lang="zh-CN" altLang="en-US" i="0">
+                                    <a:latin typeface="Cambria Math" charset="0"/>
+                                  </a:rPr>
+                                  <m:t>−4</m:t>
+                                </m:r>
+                              </m:e>
+                            </m:mr>
+                          </m:m>
+                        </m:e>
+                      </m:d>
+                    </m:oMath>
+                  </m:oMathPara>
+                </a14:m>
+                <a:endParaRPr lang="zh-CN" altLang="en-US" dirty="0"/>
+              </a:p>
+            </p:txBody>
+          </p:sp>
+        </mc:Choice>
+        <mc:Fallback xmlns="">
+          <p:sp>
+            <p:nvSpPr>
+              <p:cNvPr id="5" name="矩形 4"/>
+              <p:cNvSpPr>
+                <a:spLocks noRot="1" noChangeAspect="1" noMove="1" noResize="1" noEditPoints="1" noAdjustHandles="1" noChangeArrowheads="1" noChangeShapeType="1" noTextEdit="1"/>
+              </p:cNvSpPr>
+              <p:nvPr/>
+            </p:nvSpPr>
+            <p:spPr>
+              <a:xfrm>
+                <a:off x="1562902" y="1373892"/>
+                <a:ext cx="2764090" cy="369332"/>
+              </a:xfrm>
+              <a:prstGeom prst="rect">
+                <a:avLst/>
+              </a:prstGeom>
+              <a:blipFill rotWithShape="0">
+                <a:blip r:embed="rId5"/>
+                <a:stretch>
+                  <a:fillRect t="-118033" r="-17841" b="-185246"/>
+                </a:stretch>
+              </a:blipFill>
+            </p:spPr>
+            <p:txBody>
+              <a:bodyPr/>
+              <a:lstStyle/>
+              <a:p>
+                <a:r>
+                  <a:rPr lang="zh-CN" altLang="en-US">
+                    <a:noFill/>
+                  </a:rPr>
+                  <a:t> </a:t>
+                </a:r>
+              </a:p>
+            </p:txBody>
+          </p:sp>
+        </mc:Fallback>
+      </mc:AlternateContent>
+      <mc:AlternateContent xmlns:mc="http://schemas.openxmlformats.org/markup-compatibility/2006" xmlns:a14="http://schemas.microsoft.com/office/drawing/2010/main">
+        <mc:Choice Requires="a14">
+          <p:sp>
+            <p:nvSpPr>
+              <p:cNvPr id="6" name="矩形 5"/>
+              <p:cNvSpPr/>
+              <p:nvPr/>
+            </p:nvSpPr>
+            <p:spPr>
+              <a:xfrm>
+                <a:off x="1562902" y="2151916"/>
+                <a:ext cx="1436867" cy="380425"/>
+              </a:xfrm>
+              <a:prstGeom prst="rect">
+                <a:avLst/>
+              </a:prstGeom>
+            </p:spPr>
+            <p:txBody>
+              <a:bodyPr wrap="none">
+                <a:spAutoFit/>
+              </a:bodyPr>
+              <a:lstStyle/>
+              <a:p>
+                <a:pPr/>
+                <a14:m>
+                  <m:oMathPara xmlns:m="http://schemas.openxmlformats.org/officeDocument/2006/math">
+                    <m:oMathParaPr>
+                      <m:jc m:val="centerGroup"/>
+                    </m:oMathParaPr>
+                    <m:oMath xmlns:m="http://schemas.openxmlformats.org/officeDocument/2006/math">
+                      <m:acc>
+                        <m:accPr>
+                          <m:chr m:val="̌"/>
+                          <m:ctrlPr>
+                            <a:rPr lang="zh-CN" altLang="en-US" i="1">
+                              <a:latin typeface="Cambria Math" panose="02040503050406030204" pitchFamily="18" charset="0"/>
+                            </a:rPr>
+                          </m:ctrlPr>
+                        </m:accPr>
+                        <m:e>
+                          <m:r>
+                            <a:rPr lang="zh-CN" altLang="en-US" i="1">
+                              <a:latin typeface="Cambria Math" charset="0"/>
+                            </a:rPr>
+                            <m:t>𝐴</m:t>
+                          </m:r>
+                        </m:e>
+                      </m:acc>
+                      <m:r>
+                        <a:rPr lang="zh-CN" altLang="en-US" i="0">
+                          <a:latin typeface="Cambria Math" charset="0"/>
+                        </a:rPr>
+                        <m:t>=</m:t>
+                      </m:r>
+                      <m:r>
+                        <a:rPr lang="zh-CN" altLang="en-US" i="1">
+                          <a:latin typeface="Cambria Math" charset="0"/>
+                        </a:rPr>
+                        <m:t>𝐴</m:t>
+                      </m:r>
+                      <m:r>
+                        <a:rPr lang="zh-CN" altLang="en-US" i="0">
+                          <a:latin typeface="Cambria Math" charset="0"/>
+                        </a:rPr>
+                        <m:t>−</m:t>
+                      </m:r>
+                      <m:r>
+                        <a:rPr lang="zh-CN" altLang="en-US" i="1">
+                          <a:latin typeface="Cambria Math" charset="0"/>
+                        </a:rPr>
+                        <m:t>𝐵𝐾</m:t>
+                      </m:r>
+                    </m:oMath>
+                  </m:oMathPara>
+                </a14:m>
+                <a:endParaRPr lang="zh-CN" altLang="en-US" dirty="0"/>
+              </a:p>
+            </p:txBody>
+          </p:sp>
+        </mc:Choice>
+        <mc:Fallback xmlns="">
+          <p:sp>
+            <p:nvSpPr>
+              <p:cNvPr id="6" name="矩形 5"/>
+              <p:cNvSpPr>
+                <a:spLocks noRot="1" noChangeAspect="1" noMove="1" noResize="1" noEditPoints="1" noAdjustHandles="1" noChangeArrowheads="1" noChangeShapeType="1" noTextEdit="1"/>
+              </p:cNvSpPr>
+              <p:nvPr/>
+            </p:nvSpPr>
+            <p:spPr>
+              <a:xfrm>
+                <a:off x="1562902" y="2151916"/>
+                <a:ext cx="1436867" cy="380425"/>
+              </a:xfrm>
+              <a:prstGeom prst="rect">
+                <a:avLst/>
+              </a:prstGeom>
+              <a:blipFill rotWithShape="0">
+                <a:blip r:embed="rId6"/>
+                <a:stretch>
+                  <a:fillRect t="-6452"/>
+                </a:stretch>
+              </a:blipFill>
+            </p:spPr>
+            <p:txBody>
+              <a:bodyPr/>
+              <a:lstStyle/>
+              <a:p>
+                <a:r>
+                  <a:rPr lang="zh-CN" altLang="en-US">
+                    <a:noFill/>
+                  </a:rPr>
+                  <a:t> </a:t>
+                </a:r>
+              </a:p>
+            </p:txBody>
+          </p:sp>
+        </mc:Fallback>
+      </mc:AlternateContent>
+      <mc:AlternateContent xmlns:mc="http://schemas.openxmlformats.org/markup-compatibility/2006" xmlns:a14="http://schemas.microsoft.com/office/drawing/2010/main">
+        <mc:Choice Requires="a14">
+          <p:sp>
+            <p:nvSpPr>
+              <p:cNvPr id="9" name="矩形 8"/>
+              <p:cNvSpPr/>
+              <p:nvPr/>
+            </p:nvSpPr>
+            <p:spPr>
+              <a:xfrm>
+                <a:off x="1562902" y="2982621"/>
+                <a:ext cx="4533805" cy="369332"/>
+              </a:xfrm>
+              <a:prstGeom prst="rect">
+                <a:avLst/>
+              </a:prstGeom>
+            </p:spPr>
+            <p:txBody>
+              <a:bodyPr wrap="none">
+                <a:spAutoFit/>
+              </a:bodyPr>
+              <a:lstStyle/>
+              <a:p>
+                <a:pPr/>
+                <a14:m>
+                  <m:oMathPara xmlns:m="http://schemas.openxmlformats.org/officeDocument/2006/math">
+                    <m:oMathParaPr>
+                      <m:jc m:val="centerGroup"/>
+                    </m:oMathParaPr>
+                    <m:oMath xmlns:m="http://schemas.openxmlformats.org/officeDocument/2006/math">
+                      <m:d>
+                        <m:dPr>
+                          <m:begChr m:val=""/>
+                          <m:ctrlPr>
+                            <a:rPr lang="zh-CN" altLang="en-US" i="1">
+                              <a:latin typeface="Cambria Math" panose="02040503050406030204" pitchFamily="18" charset="0"/>
+                            </a:rPr>
+                          </m:ctrlPr>
+                        </m:dPr>
+                        <m:e>
+                          <m:r>
+                            <a:rPr lang="zh-CN" altLang="en-US" i="1">
+                              <a:latin typeface="Cambria Math" charset="0"/>
+                            </a:rPr>
+                            <m:t>𝐾</m:t>
+                          </m:r>
+                          <m:r>
+                            <a:rPr lang="zh-CN" altLang="en-US" i="0">
+                              <a:latin typeface="Cambria Math" charset="0"/>
+                            </a:rPr>
+                            <m:t>=(</m:t>
+                          </m:r>
+                          <m:m>
+                            <m:mPr>
+                              <m:plcHide m:val="on"/>
+                              <m:mcs>
+                                <m:mc>
+                                  <m:mcPr>
+                                    <m:count m:val="4"/>
+                                    <m:mcJc m:val="center"/>
+                                  </m:mcPr>
+                                </m:mc>
+                              </m:mcs>
+                              <m:ctrlPr>
+                                <a:rPr lang="zh-CN" altLang="en-US" i="1">
+                                  <a:latin typeface="Cambria Math" panose="02040503050406030204" pitchFamily="18" charset="0"/>
+                                </a:rPr>
+                              </m:ctrlPr>
+                            </m:mPr>
+                            <m:mr>
+                              <m:e>
+                                <m:r>
+                                  <a:rPr lang="zh-CN" altLang="en-US" i="0">
+                                    <a:latin typeface="Cambria Math" charset="0"/>
+                                  </a:rPr>
+                                  <m:t>−18.48</m:t>
+                                </m:r>
+                              </m:e>
+                              <m:e>
+                                <m:r>
+                                  <a:rPr lang="zh-CN" altLang="en-US" i="0">
+                                    <a:latin typeface="Cambria Math" charset="0"/>
+                                  </a:rPr>
+                                  <m:t>−659.5</m:t>
+                                </m:r>
+                              </m:e>
+                              <m:e>
+                                <m:r>
+                                  <a:rPr lang="zh-CN" altLang="en-US" i="0">
+                                    <a:latin typeface="Cambria Math" charset="0"/>
+                                  </a:rPr>
+                                  <m:t>−21.64</m:t>
+                                </m:r>
+                              </m:e>
+                              <m:e>
+                                <m:r>
+                                  <a:rPr lang="zh-CN" altLang="en-US" i="0">
+                                    <a:latin typeface="Cambria Math" charset="0"/>
+                                  </a:rPr>
+                                  <m:t>−161.8</m:t>
+                                </m:r>
+                              </m:e>
+                            </m:mr>
+                          </m:m>
+                        </m:e>
+                      </m:d>
+                    </m:oMath>
+                  </m:oMathPara>
+                </a14:m>
+                <a:endParaRPr lang="zh-CN" altLang="en-US" dirty="0"/>
+              </a:p>
+            </p:txBody>
+          </p:sp>
+        </mc:Choice>
+        <mc:Fallback xmlns="">
+          <p:sp>
+            <p:nvSpPr>
+              <p:cNvPr id="9" name="矩形 8"/>
+              <p:cNvSpPr>
+                <a:spLocks noRot="1" noChangeAspect="1" noMove="1" noResize="1" noEditPoints="1" noAdjustHandles="1" noChangeArrowheads="1" noChangeShapeType="1" noTextEdit="1"/>
+              </p:cNvSpPr>
+              <p:nvPr/>
+            </p:nvSpPr>
+            <p:spPr>
+              <a:xfrm>
+                <a:off x="1562902" y="2982621"/>
+                <a:ext cx="4533805" cy="369332"/>
+              </a:xfrm>
+              <a:prstGeom prst="rect">
+                <a:avLst/>
+              </a:prstGeom>
+              <a:blipFill rotWithShape="0">
+                <a:blip r:embed="rId7"/>
+                <a:stretch>
+                  <a:fillRect t="-118033" r="-10887" b="-185246"/>
+                </a:stretch>
+              </a:blipFill>
+            </p:spPr>
+            <p:txBody>
+              <a:bodyPr/>
+              <a:lstStyle/>
+              <a:p>
+                <a:r>
+                  <a:rPr lang="zh-CN" altLang="en-US">
+                    <a:noFill/>
+                  </a:rPr>
+                  <a:t> </a:t>
+                </a:r>
+              </a:p>
+            </p:txBody>
+          </p:sp>
+        </mc:Fallback>
+      </mc:AlternateContent>
+      <mc:AlternateContent xmlns:mc="http://schemas.openxmlformats.org/markup-compatibility/2006" xmlns:a14="http://schemas.microsoft.com/office/drawing/2010/main">
+        <mc:Choice Requires="a14">
+          <p:sp>
+            <p:nvSpPr>
+              <p:cNvPr id="14" name="矩形 13"/>
+              <p:cNvSpPr/>
+              <p:nvPr/>
+            </p:nvSpPr>
+            <p:spPr>
+              <a:xfrm>
+                <a:off x="1562902" y="3658530"/>
+                <a:ext cx="4659609" cy="1126975"/>
+              </a:xfrm>
+              <a:prstGeom prst="rect">
+                <a:avLst/>
+              </a:prstGeom>
+            </p:spPr>
+            <p:txBody>
+              <a:bodyPr wrap="none">
+                <a:spAutoFit/>
+              </a:bodyPr>
+              <a:lstStyle/>
+              <a:p>
+                <a:pPr/>
+                <a14:m>
+                  <m:oMathPara xmlns:m="http://schemas.openxmlformats.org/officeDocument/2006/math">
+                    <m:oMathParaPr>
+                      <m:jc m:val="centerGroup"/>
+                    </m:oMathParaPr>
+                    <m:oMath xmlns:m="http://schemas.openxmlformats.org/officeDocument/2006/math">
+                      <m:acc>
+                        <m:accPr>
+                          <m:chr m:val="̌"/>
+                          <m:ctrlPr>
+                            <a:rPr lang="zh-CN" altLang="en-US" i="1">
+                              <a:latin typeface="Cambria Math" panose="02040503050406030204" pitchFamily="18" charset="0"/>
+                            </a:rPr>
+                          </m:ctrlPr>
+                        </m:accPr>
+                        <m:e>
+                          <m:r>
+                            <a:rPr lang="zh-CN" altLang="en-US" i="1">
+                              <a:latin typeface="Cambria Math" charset="0"/>
+                            </a:rPr>
+                            <m:t>𝐴</m:t>
+                          </m:r>
+                        </m:e>
+                      </m:acc>
+                      <m:r>
+                        <a:rPr lang="zh-CN" altLang="en-US" i="0">
+                          <a:latin typeface="Cambria Math" charset="0"/>
+                        </a:rPr>
+                        <m:t>=</m:t>
+                      </m:r>
+                      <m:d>
+                        <m:dPr>
+                          <m:ctrlPr>
+                            <a:rPr lang="zh-CN" altLang="en-US" i="1">
+                              <a:latin typeface="Cambria Math" panose="02040503050406030204" pitchFamily="18" charset="0"/>
+                            </a:rPr>
+                          </m:ctrlPr>
+                        </m:dPr>
+                        <m:e>
+                          <m:m>
+                            <m:mPr>
+                              <m:plcHide m:val="on"/>
+                              <m:mcs>
+                                <m:mc>
+                                  <m:mcPr>
+                                    <m:count m:val="4"/>
+                                    <m:mcJc m:val="center"/>
+                                  </m:mcPr>
+                                </m:mc>
+                              </m:mcs>
+                              <m:ctrlPr>
+                                <a:rPr lang="zh-CN" altLang="en-US" i="1">
+                                  <a:latin typeface="Cambria Math" panose="02040503050406030204" pitchFamily="18" charset="0"/>
+                                </a:rPr>
+                              </m:ctrlPr>
+                            </m:mPr>
+                            <m:mr>
+                              <m:e>
+                                <m:r>
+                                  <a:rPr lang="zh-CN" altLang="en-US" i="0">
+                                    <a:latin typeface="Cambria Math" charset="0"/>
+                                  </a:rPr>
+                                  <m:t>0</m:t>
+                                </m:r>
+                              </m:e>
+                              <m:e>
+                                <m:r>
+                                  <a:rPr lang="zh-CN" altLang="en-US" i="0">
+                                    <a:latin typeface="Cambria Math" charset="0"/>
+                                  </a:rPr>
+                                  <m:t>0</m:t>
+                                </m:r>
+                              </m:e>
+                              <m:e>
+                                <m:r>
+                                  <a:rPr lang="zh-CN" altLang="en-US" i="0">
+                                    <a:latin typeface="Cambria Math" charset="0"/>
+                                  </a:rPr>
+                                  <m:t>1</m:t>
+                                </m:r>
+                              </m:e>
+                              <m:e>
+                                <m:r>
+                                  <a:rPr lang="zh-CN" altLang="en-US" i="0">
+                                    <a:latin typeface="Cambria Math" charset="0"/>
+                                  </a:rPr>
+                                  <m:t>0</m:t>
+                                </m:r>
+                              </m:e>
+                            </m:mr>
+                            <m:mr>
+                              <m:e>
+                                <m:r>
+                                  <a:rPr lang="zh-CN" altLang="en-US" i="0">
+                                    <a:latin typeface="Cambria Math" charset="0"/>
+                                  </a:rPr>
+                                  <m:t>0</m:t>
+                                </m:r>
+                              </m:e>
+                              <m:e>
+                                <m:r>
+                                  <a:rPr lang="zh-CN" altLang="en-US" i="0">
+                                    <a:latin typeface="Cambria Math" charset="0"/>
+                                  </a:rPr>
+                                  <m:t>0</m:t>
+                                </m:r>
+                              </m:e>
+                              <m:e>
+                                <m:r>
+                                  <a:rPr lang="zh-CN" altLang="en-US" i="0">
+                                    <a:latin typeface="Cambria Math" charset="0"/>
+                                  </a:rPr>
+                                  <m:t>0</m:t>
+                                </m:r>
+                              </m:e>
+                              <m:e>
+                                <m:r>
+                                  <a:rPr lang="zh-CN" altLang="en-US" i="0">
+                                    <a:latin typeface="Cambria Math" charset="0"/>
+                                  </a:rPr>
+                                  <m:t>1</m:t>
+                                </m:r>
+                              </m:e>
+                            </m:mr>
+                            <m:mr>
+                              <m:e>
+                                <m:r>
+                                  <a:rPr lang="zh-CN" altLang="en-US" i="0">
+                                    <a:latin typeface="Cambria Math" charset="0"/>
+                                  </a:rPr>
+                                  <m:t>17.04</m:t>
+                                </m:r>
+                              </m:e>
+                              <m:e>
+                                <m:r>
+                                  <a:rPr lang="zh-CN" altLang="en-US" i="0">
+                                    <a:latin typeface="Cambria Math" charset="0"/>
+                                  </a:rPr>
+                                  <m:t>449.8</m:t>
+                                </m:r>
+                              </m:e>
+                              <m:e>
+                                <m:r>
+                                  <a:rPr lang="zh-CN" altLang="en-US" i="0">
+                                    <a:latin typeface="Cambria Math" charset="0"/>
+                                  </a:rPr>
+                                  <m:t>19.88</m:t>
+                                </m:r>
+                              </m:e>
+                              <m:e>
+                                <m:r>
+                                  <a:rPr lang="zh-CN" altLang="en-US" i="0">
+                                    <a:latin typeface="Cambria Math" charset="0"/>
+                                  </a:rPr>
+                                  <m:t>154.7</m:t>
+                                </m:r>
+                              </m:e>
+                            </m:mr>
+                            <m:mr>
+                              <m:e>
+                                <m:r>
+                                  <a:rPr lang="zh-CN" altLang="en-US" i="0">
+                                    <a:latin typeface="Cambria Math" charset="0"/>
+                                  </a:rPr>
+                                  <m:t>−3.732</m:t>
+                                </m:r>
+                              </m:e>
+                              <m:e>
+                                <m:r>
+                                  <a:rPr lang="zh-CN" altLang="en-US" i="0">
+                                    <a:latin typeface="Cambria Math" charset="0"/>
+                                  </a:rPr>
+                                  <m:t>−90.04</m:t>
+                                </m:r>
+                              </m:e>
+                              <m:e>
+                                <m:r>
+                                  <a:rPr lang="zh-CN" altLang="en-US" i="0">
+                                    <a:latin typeface="Cambria Math" charset="0"/>
+                                  </a:rPr>
+                                  <m:t>−4.354</m:t>
+                                </m:r>
+                              </m:e>
+                              <m:e>
+                                <m:r>
+                                  <a:rPr lang="zh-CN" altLang="en-US" i="0">
+                                    <a:latin typeface="Cambria Math" charset="0"/>
+                                  </a:rPr>
+                                  <m:t>−33.88</m:t>
+                                </m:r>
+                              </m:e>
+                            </m:mr>
+                          </m:m>
+                        </m:e>
+                      </m:d>
+                    </m:oMath>
+                  </m:oMathPara>
+                </a14:m>
+                <a:endParaRPr lang="zh-CN" altLang="en-US" dirty="0"/>
+              </a:p>
+            </p:txBody>
+          </p:sp>
+        </mc:Choice>
+        <mc:Fallback xmlns="">
+          <p:sp>
+            <p:nvSpPr>
+              <p:cNvPr id="14" name="矩形 13"/>
+              <p:cNvSpPr>
+                <a:spLocks noRot="1" noChangeAspect="1" noMove="1" noResize="1" noEditPoints="1" noAdjustHandles="1" noChangeArrowheads="1" noChangeShapeType="1" noTextEdit="1"/>
+              </p:cNvSpPr>
+              <p:nvPr/>
+            </p:nvSpPr>
+            <p:spPr>
+              <a:xfrm>
+                <a:off x="1562902" y="3658530"/>
+                <a:ext cx="4659609" cy="1126975"/>
+              </a:xfrm>
+              <a:prstGeom prst="rect">
+                <a:avLst/>
+              </a:prstGeom>
+              <a:blipFill rotWithShape="0">
+                <a:blip r:embed="rId8"/>
+                <a:stretch>
+                  <a:fillRect/>
+                </a:stretch>
+              </a:blipFill>
+            </p:spPr>
+            <p:txBody>
+              <a:bodyPr/>
+              <a:lstStyle/>
+              <a:p>
+                <a:r>
+                  <a:rPr lang="zh-CN" altLang="en-US">
+                    <a:noFill/>
+                  </a:rPr>
+                  <a:t> </a:t>
+                </a:r>
+              </a:p>
+            </p:txBody>
+          </p:sp>
+        </mc:Fallback>
+      </mc:AlternateContent>
+    </p:spTree>
+    <p:extLst>
+      <p:ext uri="{BB962C8B-B14F-4D97-AF65-F5344CB8AC3E}">
+        <p14:creationId xmlns:p14="http://schemas.microsoft.com/office/powerpoint/2010/main" val="1250528991"/>
+      </p:ext>
+    </p:extLst>
+  </p:cSld>
+  <p:clrMapOvr>
+    <a:masterClrMapping/>
+  </p:clrMapOvr>
+  <p:timing>
+    <p:tnLst>
+      <p:par>
+        <p:cTn id="1" dur="indefinite" restart="never" nodeType="tmRoot"/>
+      </p:par>
+    </p:tnLst>
+  </p:timing>
+</p:sld>
+</file>
+
+<file path=ppt/slides/slide8.xml><?xml version="1.0" encoding="utf-8"?>
+<p:sld xmlns:a="http://schemas.openxmlformats.org/drawingml/2006/main" xmlns:r="http://schemas.openxmlformats.org/officeDocument/2006/relationships" xmlns:p="http://schemas.openxmlformats.org/presentationml/2006/main">
+  <p:cSld>
+    <p:spTree>
+      <p:nvGrpSpPr>
+        <p:cNvPr id="1" name=""/>
+        <p:cNvGrpSpPr/>
+        <p:nvPr/>
+      </p:nvGrpSpPr>
+      <p:grpSpPr>
+        <a:xfrm>
+          <a:off x="0" y="0"/>
+          <a:ext cx="0" cy="0"/>
+          <a:chOff x="0" y="0"/>
+          <a:chExt cx="0" cy="0"/>
+        </a:xfrm>
+      </p:grpSpPr>
+      <p:sp>
+        <p:nvSpPr>
+          <p:cNvPr id="2" name="标题 1"/>
+          <p:cNvSpPr>
+            <a:spLocks noGrp="1"/>
+          </p:cNvSpPr>
+          <p:nvPr>
+            <p:ph type="title"/>
+          </p:nvPr>
+        </p:nvSpPr>
+        <p:spPr>
+          <a:xfrm>
+            <a:off x="1371600" y="178370"/>
+            <a:ext cx="9601200" cy="753533"/>
+          </a:xfrm>
+        </p:spPr>
+        <p:txBody>
+          <a:bodyPr/>
+          <a:lstStyle/>
+          <a:p>
+            <a:r>
+              <a:rPr kumimoji="1" lang="zh-CN" altLang="en-US" b="1" dirty="0" smtClean="0"/>
+              <a:t>状态反馈控制</a:t>
+            </a:r>
+            <a:endParaRPr kumimoji="1" lang="zh-CN" altLang="en-US" b="1" dirty="0"/>
+          </a:p>
+        </p:txBody>
+      </p:sp>
+      <p:sp>
+        <p:nvSpPr>
+          <p:cNvPr id="3" name="内容占位符 2"/>
+          <p:cNvSpPr>
+            <a:spLocks noGrp="1"/>
+          </p:cNvSpPr>
+          <p:nvPr>
+            <p:ph idx="1"/>
+          </p:nvPr>
+        </p:nvSpPr>
+        <p:spPr>
+          <a:xfrm>
+            <a:off x="1371600" y="965199"/>
+            <a:ext cx="9601200" cy="609601"/>
+          </a:xfrm>
+        </p:spPr>
+        <p:txBody>
+          <a:bodyPr>
+            <a:normAutofit/>
+          </a:bodyPr>
+          <a:lstStyle/>
+          <a:p>
+            <a:r>
+              <a:rPr kumimoji="1" lang="en-US" altLang="zh-CN" b="1" dirty="0" smtClean="0"/>
+              <a:t>Simulink</a:t>
+            </a:r>
+            <a:r>
+              <a:rPr kumimoji="1" lang="zh-CN" altLang="en-US" b="1" dirty="0" smtClean="0"/>
+              <a:t>模型</a:t>
+            </a:r>
+            <a:r>
+              <a:rPr kumimoji="1" lang="en-US" altLang="zh-CN" b="1" dirty="0" smtClean="0"/>
+              <a:t>——</a:t>
+            </a:r>
+            <a:r>
+              <a:rPr kumimoji="1" lang="zh-CN" altLang="en-US" b="1" dirty="0" smtClean="0"/>
+              <a:t>线性模型：</a:t>
+            </a:r>
+            <a:endParaRPr kumimoji="1" lang="en-US" altLang="zh-CN" b="1" dirty="0" smtClean="0"/>
+          </a:p>
+          <a:p>
+            <a:pPr marL="0" indent="0">
+              <a:buNone/>
+            </a:pPr>
+            <a:endParaRPr kumimoji="1" lang="en-US" altLang="zh-CN" b="1" dirty="0" smtClean="0"/>
+          </a:p>
+        </p:txBody>
+      </p:sp>
+      <p:pic>
+        <p:nvPicPr>
+          <p:cNvPr id="13" name="图片 12"/>
+          <p:cNvPicPr>
+            <a:picLocks noChangeAspect="1"/>
+          </p:cNvPicPr>
+          <p:nvPr/>
+        </p:nvPicPr>
+        <p:blipFill rotWithShape="1">
+          <a:blip r:embed="rId2">
+            <a:extLst>
+              <a:ext uri="{28A0092B-C50C-407E-A947-70E740481C1C}">
+                <a14:useLocalDpi xmlns:a14="http://schemas.microsoft.com/office/drawing/2010/main" val="0"/>
+              </a:ext>
+            </a:extLst>
+          </a:blip>
+          <a:srcRect l="2882" t="10550" r="9011" b="6422"/>
+          <a:stretch/>
+        </p:blipFill>
+        <p:spPr>
+          <a:xfrm>
+            <a:off x="2476500" y="2306596"/>
+            <a:ext cx="8590742" cy="3179804"/>
+          </a:xfrm>
+          <a:prstGeom prst="rect">
+            <a:avLst/>
+          </a:prstGeom>
+        </p:spPr>
+      </p:pic>
+    </p:spTree>
+    <p:extLst>
+      <p:ext uri="{BB962C8B-B14F-4D97-AF65-F5344CB8AC3E}">
+        <p14:creationId xmlns:p14="http://schemas.microsoft.com/office/powerpoint/2010/main" val="1094252062"/>
+      </p:ext>
+    </p:extLst>
+  </p:cSld>
+  <p:clrMapOvr>
+    <a:masterClrMapping/>
+  </p:clrMapOvr>
+  <p:timing>
+    <p:tnLst>
+      <p:par>
+        <p:cTn id="1" dur="indefinite" restart="never" nodeType="tmRoot"/>
+      </p:par>
+    </p:tnLst>
+  </p:timing>
+</p:sld>
+</file>
+
+<file path=ppt/slides/slide9.xml><?xml version="1.0" encoding="utf-8"?>
+<p:sld xmlns:a="http://schemas.openxmlformats.org/drawingml/2006/main" xmlns:r="http://schemas.openxmlformats.org/officeDocument/2006/relationships" xmlns:p="http://schemas.openxmlformats.org/presentationml/2006/main">
+  <p:cSld>
+    <p:spTree>
+      <p:nvGrpSpPr>
+        <p:cNvPr id="1" name=""/>
+        <p:cNvGrpSpPr/>
+        <p:nvPr/>
+      </p:nvGrpSpPr>
+      <p:grpSpPr>
+        <a:xfrm>
+          <a:off x="0" y="0"/>
+          <a:ext cx="0" cy="0"/>
+          <a:chOff x="0" y="0"/>
+          <a:chExt cx="0" cy="0"/>
+        </a:xfrm>
+      </p:grpSpPr>
+      <p:sp>
+        <p:nvSpPr>
+          <p:cNvPr id="2" name="标题 1"/>
+          <p:cNvSpPr>
+            <a:spLocks noGrp="1"/>
+          </p:cNvSpPr>
+          <p:nvPr>
+            <p:ph type="title"/>
+          </p:nvPr>
+        </p:nvSpPr>
+        <p:spPr>
+          <a:xfrm>
+            <a:off x="1371600" y="178370"/>
+            <a:ext cx="9601200" cy="753533"/>
+          </a:xfrm>
+        </p:spPr>
+        <p:txBody>
+          <a:bodyPr/>
+          <a:lstStyle/>
+          <a:p>
+            <a:r>
+              <a:rPr kumimoji="1" lang="zh-CN" altLang="en-US" b="1" dirty="0" smtClean="0"/>
+              <a:t>状态反馈控制</a:t>
+            </a:r>
+            <a:endParaRPr kumimoji="1" lang="zh-CN" altLang="en-US" b="1" dirty="0"/>
+          </a:p>
+        </p:txBody>
+      </p:sp>
+      <p:sp>
+        <p:nvSpPr>
+          <p:cNvPr id="3" name="内容占位符 2"/>
+          <p:cNvSpPr>
+            <a:spLocks noGrp="1"/>
+          </p:cNvSpPr>
+          <p:nvPr>
+            <p:ph idx="1"/>
+          </p:nvPr>
+        </p:nvSpPr>
+        <p:spPr>
+          <a:xfrm>
+            <a:off x="1371600" y="965199"/>
+            <a:ext cx="9601200" cy="609601"/>
+          </a:xfrm>
+        </p:spPr>
+        <p:txBody>
+          <a:bodyPr>
+            <a:normAutofit/>
+          </a:bodyPr>
+          <a:lstStyle/>
+          <a:p>
+            <a:r>
+              <a:rPr kumimoji="1" lang="en-US" altLang="zh-CN" b="1" dirty="0" smtClean="0"/>
+              <a:t>Simulink</a:t>
+            </a:r>
+            <a:r>
+              <a:rPr kumimoji="1" lang="zh-CN" altLang="en-US" b="1" dirty="0" smtClean="0"/>
+              <a:t>模型</a:t>
+            </a:r>
+            <a:r>
+              <a:rPr kumimoji="1" lang="en-US" altLang="zh-CN" b="1" dirty="0" smtClean="0"/>
+              <a:t>——</a:t>
+            </a:r>
+            <a:r>
+              <a:rPr kumimoji="1" lang="zh-CN" altLang="en-US" b="1" dirty="0" smtClean="0"/>
+              <a:t>非线性模型：</a:t>
+            </a:r>
+            <a:endParaRPr kumimoji="1" lang="en-US" altLang="zh-CN" b="1" dirty="0" smtClean="0"/>
+          </a:p>
+          <a:p>
+            <a:pPr marL="0" indent="0">
+              <a:buNone/>
+            </a:pPr>
+            <a:endParaRPr kumimoji="1" lang="en-US" altLang="zh-CN" b="1" dirty="0" smtClean="0"/>
+          </a:p>
+        </p:txBody>
+      </p:sp>
+      <p:pic>
+        <p:nvPicPr>
+          <p:cNvPr id="4" name="图片 3"/>
+          <p:cNvPicPr>
+            <a:picLocks noChangeAspect="1"/>
+          </p:cNvPicPr>
+          <p:nvPr/>
+        </p:nvPicPr>
+        <p:blipFill>
+          <a:blip r:embed="rId2"/>
+          <a:stretch>
+            <a:fillRect/>
+          </a:stretch>
+        </p:blipFill>
+        <p:spPr>
+          <a:xfrm>
+            <a:off x="2536824" y="1381125"/>
+            <a:ext cx="8004175" cy="5324475"/>
+          </a:xfrm>
+          <a:prstGeom prst="rect">
+            <a:avLst/>
+          </a:prstGeom>
+        </p:spPr>
+      </p:pic>
+    </p:spTree>
+    <p:extLst>
+      <p:ext uri="{BB962C8B-B14F-4D97-AF65-F5344CB8AC3E}">
+        <p14:creationId xmlns:p14="http://schemas.microsoft.com/office/powerpoint/2010/main" val="2696115295"/>
       </p:ext>
     </p:extLst>
   </p:cSld>

</xml_diff>